<commit_message>
Added how to take this course and more details
</commit_message>
<xml_diff>
--- a/figures/Presentation1.pptx
+++ b/figures/Presentation1.pptx
@@ -104,6 +104,11 @@
       </a:defRPr>
     </a:lvl9pPr>
   </p:defaultTextStyle>
+  <p:extLst>
+    <p:ext uri="{EFAFB233-063F-42B5-8137-9DF3F51BA10A}">
+      <p15:sldGuideLst xmlns:p15="http://schemas.microsoft.com/office/powerpoint/2012/main"/>
+    </p:ext>
+  </p:extLst>
 </p:presentation>
 </file>
 
@@ -254,7 +259,7 @@
           <a:p>
             <a:fld id="{B86BE4D7-C5EC-4E43-B42C-A8009AFC55F9}" type="datetimeFigureOut">
               <a:rPr lang="en-US" smtClean="0"/>
-              <a:t>12/15/22</a:t>
+              <a:t>12/18/22</a:t>
             </a:fld>
             <a:endParaRPr lang="en-US"/>
           </a:p>
@@ -452,7 +457,7 @@
           <a:p>
             <a:fld id="{B86BE4D7-C5EC-4E43-B42C-A8009AFC55F9}" type="datetimeFigureOut">
               <a:rPr lang="en-US" smtClean="0"/>
-              <a:t>12/15/22</a:t>
+              <a:t>12/18/22</a:t>
             </a:fld>
             <a:endParaRPr lang="en-US"/>
           </a:p>
@@ -660,7 +665,7 @@
           <a:p>
             <a:fld id="{B86BE4D7-C5EC-4E43-B42C-A8009AFC55F9}" type="datetimeFigureOut">
               <a:rPr lang="en-US" smtClean="0"/>
-              <a:t>12/15/22</a:t>
+              <a:t>12/18/22</a:t>
             </a:fld>
             <a:endParaRPr lang="en-US"/>
           </a:p>
@@ -858,7 +863,7 @@
           <a:p>
             <a:fld id="{B86BE4D7-C5EC-4E43-B42C-A8009AFC55F9}" type="datetimeFigureOut">
               <a:rPr lang="en-US" smtClean="0"/>
-              <a:t>12/15/22</a:t>
+              <a:t>12/18/22</a:t>
             </a:fld>
             <a:endParaRPr lang="en-US"/>
           </a:p>
@@ -1133,7 +1138,7 @@
           <a:p>
             <a:fld id="{B86BE4D7-C5EC-4E43-B42C-A8009AFC55F9}" type="datetimeFigureOut">
               <a:rPr lang="en-US" smtClean="0"/>
-              <a:t>12/15/22</a:t>
+              <a:t>12/18/22</a:t>
             </a:fld>
             <a:endParaRPr lang="en-US"/>
           </a:p>
@@ -1398,7 +1403,7 @@
           <a:p>
             <a:fld id="{B86BE4D7-C5EC-4E43-B42C-A8009AFC55F9}" type="datetimeFigureOut">
               <a:rPr lang="en-US" smtClean="0"/>
-              <a:t>12/15/22</a:t>
+              <a:t>12/18/22</a:t>
             </a:fld>
             <a:endParaRPr lang="en-US"/>
           </a:p>
@@ -1810,7 +1815,7 @@
           <a:p>
             <a:fld id="{B86BE4D7-C5EC-4E43-B42C-A8009AFC55F9}" type="datetimeFigureOut">
               <a:rPr lang="en-US" smtClean="0"/>
-              <a:t>12/15/22</a:t>
+              <a:t>12/18/22</a:t>
             </a:fld>
             <a:endParaRPr lang="en-US"/>
           </a:p>
@@ -1951,7 +1956,7 @@
           <a:p>
             <a:fld id="{B86BE4D7-C5EC-4E43-B42C-A8009AFC55F9}" type="datetimeFigureOut">
               <a:rPr lang="en-US" smtClean="0"/>
-              <a:t>12/15/22</a:t>
+              <a:t>12/18/22</a:t>
             </a:fld>
             <a:endParaRPr lang="en-US"/>
           </a:p>
@@ -2064,7 +2069,7 @@
           <a:p>
             <a:fld id="{B86BE4D7-C5EC-4E43-B42C-A8009AFC55F9}" type="datetimeFigureOut">
               <a:rPr lang="en-US" smtClean="0"/>
-              <a:t>12/15/22</a:t>
+              <a:t>12/18/22</a:t>
             </a:fld>
             <a:endParaRPr lang="en-US"/>
           </a:p>
@@ -2375,7 +2380,7 @@
           <a:p>
             <a:fld id="{B86BE4D7-C5EC-4E43-B42C-A8009AFC55F9}" type="datetimeFigureOut">
               <a:rPr lang="en-US" smtClean="0"/>
-              <a:t>12/15/22</a:t>
+              <a:t>12/18/22</a:t>
             </a:fld>
             <a:endParaRPr lang="en-US"/>
           </a:p>
@@ -2663,7 +2668,7 @@
           <a:p>
             <a:fld id="{B86BE4D7-C5EC-4E43-B42C-A8009AFC55F9}" type="datetimeFigureOut">
               <a:rPr lang="en-US" smtClean="0"/>
-              <a:t>12/15/22</a:t>
+              <a:t>12/18/22</a:t>
             </a:fld>
             <a:endParaRPr lang="en-US"/>
           </a:p>
@@ -2904,7 +2909,7 @@
           <a:p>
             <a:fld id="{B86BE4D7-C5EC-4E43-B42C-A8009AFC55F9}" type="datetimeFigureOut">
               <a:rPr lang="en-US" smtClean="0"/>
-              <a:t>12/15/22</a:t>
+              <a:t>12/18/22</a:t>
             </a:fld>
             <a:endParaRPr lang="en-US"/>
           </a:p>
@@ -3429,7 +3434,7 @@
         </p:nvSpPr>
         <p:spPr>
           <a:xfrm>
-            <a:off x="3950975" y="1498422"/>
+            <a:off x="3965489" y="1514448"/>
             <a:ext cx="7529825" cy="393538"/>
           </a:xfrm>
           <a:prstGeom prst="rect">
@@ -3520,7 +3525,7 @@
         </p:nvSpPr>
         <p:spPr>
           <a:xfrm>
-            <a:off x="3983058" y="2819392"/>
+            <a:off x="3974084" y="2816352"/>
             <a:ext cx="7497741" cy="444961"/>
           </a:xfrm>
           <a:prstGeom prst="rect">
@@ -3908,7 +3913,7 @@
         </p:nvSpPr>
         <p:spPr>
           <a:xfrm>
-            <a:off x="4921654" y="1031422"/>
+            <a:off x="4881386" y="1030401"/>
             <a:ext cx="663964" cy="369332"/>
           </a:xfrm>
           <a:prstGeom prst="rect">
@@ -3945,7 +3950,7 @@
         </p:nvSpPr>
         <p:spPr>
           <a:xfrm>
-            <a:off x="5668256" y="1030061"/>
+            <a:off x="5642072" y="1030061"/>
             <a:ext cx="663964" cy="369332"/>
           </a:xfrm>
           <a:prstGeom prst="rect">
@@ -3982,7 +3987,7 @@
         </p:nvSpPr>
         <p:spPr>
           <a:xfrm>
-            <a:off x="6553059" y="1030061"/>
+            <a:off x="6466255" y="1036490"/>
             <a:ext cx="663964" cy="369332"/>
           </a:xfrm>
           <a:prstGeom prst="rect">
@@ -4019,7 +4024,7 @@
         </p:nvSpPr>
         <p:spPr>
           <a:xfrm>
-            <a:off x="7462835" y="1030061"/>
+            <a:off x="7301804" y="1036490"/>
             <a:ext cx="710451" cy="369332"/>
           </a:xfrm>
           <a:prstGeom prst="rect">
@@ -4056,7 +4061,7 @@
         </p:nvSpPr>
         <p:spPr>
           <a:xfrm>
-            <a:off x="8419098" y="1018348"/>
+            <a:off x="8272234" y="1030061"/>
             <a:ext cx="663964" cy="369332"/>
           </a:xfrm>
           <a:prstGeom prst="rect">
@@ -4081,7 +4086,7 @@
       </p:sp>
       <p:sp>
         <p:nvSpPr>
-          <p:cNvPr id="24" name="Oval 23">
+          <p:cNvPr id="31" name="Oval 30">
             <a:extLst>
               <a:ext uri="{FF2B5EF4-FFF2-40B4-BE49-F238E27FC236}">
                 <a16:creationId xmlns:a16="http://schemas.microsoft.com/office/drawing/2014/main" id="{89E9FAB6-D33B-058A-98D4-0AB6F514E822}"/>
@@ -4095,16 +4100,15 @@
         </p:nvSpPr>
         <p:spPr>
           <a:xfrm>
-            <a:off x="939735" y="2293744"/>
+            <a:off x="4346949" y="1605847"/>
             <a:ext cx="206893" cy="205856"/>
           </a:xfrm>
           <a:prstGeom prst="ellipse">
             <a:avLst/>
           </a:prstGeom>
           <a:solidFill>
-            <a:schemeClr val="accent2">
-              <a:lumMod val="60000"/>
-              <a:lumOff val="40000"/>
+            <a:schemeClr val="accent6">
+              <a:lumMod val="50000"/>
             </a:schemeClr>
           </a:solidFill>
           <a:ln>
@@ -4129,63 +4133,6 @@
         </p:style>
         <p:txBody>
           <a:bodyPr rtlCol="0" anchor="ctr"/>
-          <a:lstStyle/>
-          <a:p>
-            <a:pPr algn="ctr"/>
-            <a:endParaRPr lang="en-US" dirty="0"/>
-          </a:p>
-        </p:txBody>
-      </p:sp>
-      <p:sp>
-        <p:nvSpPr>
-          <p:cNvPr id="28" name="Oval 27">
-            <a:extLst>
-              <a:ext uri="{FF2B5EF4-FFF2-40B4-BE49-F238E27FC236}">
-                <a16:creationId xmlns:a16="http://schemas.microsoft.com/office/drawing/2014/main" id="{89E9FAB6-D33B-058A-98D4-0AB6F514E822}"/>
-              </a:ext>
-            </a:extLst>
-          </p:cNvPr>
-          <p:cNvSpPr>
-            <a:spLocks noChangeAspect="1"/>
-          </p:cNvSpPr>
-          <p:nvPr/>
-        </p:nvSpPr>
-        <p:spPr>
-          <a:xfrm>
-            <a:off x="1920420" y="2293744"/>
-            <a:ext cx="206893" cy="205856"/>
-          </a:xfrm>
-          <a:prstGeom prst="ellipse">
-            <a:avLst/>
-          </a:prstGeom>
-          <a:solidFill>
-            <a:schemeClr val="accent2">
-              <a:lumMod val="60000"/>
-              <a:lumOff val="40000"/>
-            </a:schemeClr>
-          </a:solidFill>
-          <a:ln>
-            <a:noFill/>
-          </a:ln>
-        </p:spPr>
-        <p:style>
-          <a:lnRef idx="2">
-            <a:schemeClr val="accent1">
-              <a:shade val="50000"/>
-            </a:schemeClr>
-          </a:lnRef>
-          <a:fillRef idx="1">
-            <a:schemeClr val="accent1"/>
-          </a:fillRef>
-          <a:effectRef idx="0">
-            <a:schemeClr val="accent1"/>
-          </a:effectRef>
-          <a:fontRef idx="minor">
-            <a:schemeClr val="lt1"/>
-          </a:fontRef>
-        </p:style>
-        <p:txBody>
-          <a:bodyPr rtlCol="0" anchor="ctr"/>
           <a:lstStyle>
             <a:defPPr>
               <a:defRPr lang="en-US"/>
@@ -4289,7 +4236,7 @@
       </p:sp>
       <p:sp>
         <p:nvSpPr>
-          <p:cNvPr id="30" name="Oval 29">
+          <p:cNvPr id="32" name="Oval 31">
             <a:extLst>
               <a:ext uri="{FF2B5EF4-FFF2-40B4-BE49-F238E27FC236}">
                 <a16:creationId xmlns:a16="http://schemas.microsoft.com/office/drawing/2014/main" id="{89E9FAB6-D33B-058A-98D4-0AB6F514E822}"/>
@@ -4303,158 +4250,7 @@
         </p:nvSpPr>
         <p:spPr>
           <a:xfrm>
-            <a:off x="2949538" y="2293744"/>
-            <a:ext cx="206893" cy="205856"/>
-          </a:xfrm>
-          <a:prstGeom prst="ellipse">
-            <a:avLst/>
-          </a:prstGeom>
-          <a:solidFill>
-            <a:schemeClr val="accent2">
-              <a:lumMod val="60000"/>
-              <a:lumOff val="40000"/>
-            </a:schemeClr>
-          </a:solidFill>
-          <a:ln>
-            <a:noFill/>
-          </a:ln>
-        </p:spPr>
-        <p:style>
-          <a:lnRef idx="2">
-            <a:schemeClr val="accent1">
-              <a:shade val="50000"/>
-            </a:schemeClr>
-          </a:lnRef>
-          <a:fillRef idx="1">
-            <a:schemeClr val="accent1"/>
-          </a:fillRef>
-          <a:effectRef idx="0">
-            <a:schemeClr val="accent1"/>
-          </a:effectRef>
-          <a:fontRef idx="minor">
-            <a:schemeClr val="lt1"/>
-          </a:fontRef>
-        </p:style>
-        <p:txBody>
-          <a:bodyPr rtlCol="0" anchor="ctr"/>
-          <a:lstStyle>
-            <a:defPPr>
-              <a:defRPr lang="en-US"/>
-            </a:defPPr>
-            <a:lvl1pPr marL="0" algn="l" defTabSz="914400" rtl="0" eaLnBrk="1" latinLnBrk="0" hangingPunct="1">
-              <a:defRPr sz="1800" kern="1200">
-                <a:solidFill>
-                  <a:schemeClr val="lt1"/>
-                </a:solidFill>
-                <a:latin typeface="+mn-lt"/>
-                <a:ea typeface="+mn-ea"/>
-                <a:cs typeface="+mn-cs"/>
-              </a:defRPr>
-            </a:lvl1pPr>
-            <a:lvl2pPr marL="457200" algn="l" defTabSz="914400" rtl="0" eaLnBrk="1" latinLnBrk="0" hangingPunct="1">
-              <a:defRPr sz="1800" kern="1200">
-                <a:solidFill>
-                  <a:schemeClr val="lt1"/>
-                </a:solidFill>
-                <a:latin typeface="+mn-lt"/>
-                <a:ea typeface="+mn-ea"/>
-                <a:cs typeface="+mn-cs"/>
-              </a:defRPr>
-            </a:lvl2pPr>
-            <a:lvl3pPr marL="914400" algn="l" defTabSz="914400" rtl="0" eaLnBrk="1" latinLnBrk="0" hangingPunct="1">
-              <a:defRPr sz="1800" kern="1200">
-                <a:solidFill>
-                  <a:schemeClr val="lt1"/>
-                </a:solidFill>
-                <a:latin typeface="+mn-lt"/>
-                <a:ea typeface="+mn-ea"/>
-                <a:cs typeface="+mn-cs"/>
-              </a:defRPr>
-            </a:lvl3pPr>
-            <a:lvl4pPr marL="1371600" algn="l" defTabSz="914400" rtl="0" eaLnBrk="1" latinLnBrk="0" hangingPunct="1">
-              <a:defRPr sz="1800" kern="1200">
-                <a:solidFill>
-                  <a:schemeClr val="lt1"/>
-                </a:solidFill>
-                <a:latin typeface="+mn-lt"/>
-                <a:ea typeface="+mn-ea"/>
-                <a:cs typeface="+mn-cs"/>
-              </a:defRPr>
-            </a:lvl4pPr>
-            <a:lvl5pPr marL="1828800" algn="l" defTabSz="914400" rtl="0" eaLnBrk="1" latinLnBrk="0" hangingPunct="1">
-              <a:defRPr sz="1800" kern="1200">
-                <a:solidFill>
-                  <a:schemeClr val="lt1"/>
-                </a:solidFill>
-                <a:latin typeface="+mn-lt"/>
-                <a:ea typeface="+mn-ea"/>
-                <a:cs typeface="+mn-cs"/>
-              </a:defRPr>
-            </a:lvl5pPr>
-            <a:lvl6pPr marL="2286000" algn="l" defTabSz="914400" rtl="0" eaLnBrk="1" latinLnBrk="0" hangingPunct="1">
-              <a:defRPr sz="1800" kern="1200">
-                <a:solidFill>
-                  <a:schemeClr val="lt1"/>
-                </a:solidFill>
-                <a:latin typeface="+mn-lt"/>
-                <a:ea typeface="+mn-ea"/>
-                <a:cs typeface="+mn-cs"/>
-              </a:defRPr>
-            </a:lvl6pPr>
-            <a:lvl7pPr marL="2743200" algn="l" defTabSz="914400" rtl="0" eaLnBrk="1" latinLnBrk="0" hangingPunct="1">
-              <a:defRPr sz="1800" kern="1200">
-                <a:solidFill>
-                  <a:schemeClr val="lt1"/>
-                </a:solidFill>
-                <a:latin typeface="+mn-lt"/>
-                <a:ea typeface="+mn-ea"/>
-                <a:cs typeface="+mn-cs"/>
-              </a:defRPr>
-            </a:lvl7pPr>
-            <a:lvl8pPr marL="3200400" algn="l" defTabSz="914400" rtl="0" eaLnBrk="1" latinLnBrk="0" hangingPunct="1">
-              <a:defRPr sz="1800" kern="1200">
-                <a:solidFill>
-                  <a:schemeClr val="lt1"/>
-                </a:solidFill>
-                <a:latin typeface="+mn-lt"/>
-                <a:ea typeface="+mn-ea"/>
-                <a:cs typeface="+mn-cs"/>
-              </a:defRPr>
-            </a:lvl8pPr>
-            <a:lvl9pPr marL="3657600" algn="l" defTabSz="914400" rtl="0" eaLnBrk="1" latinLnBrk="0" hangingPunct="1">
-              <a:defRPr sz="1800" kern="1200">
-                <a:solidFill>
-                  <a:schemeClr val="lt1"/>
-                </a:solidFill>
-                <a:latin typeface="+mn-lt"/>
-                <a:ea typeface="+mn-ea"/>
-                <a:cs typeface="+mn-cs"/>
-              </a:defRPr>
-            </a:lvl9pPr>
-          </a:lstStyle>
-          <a:p>
-            <a:pPr algn="ctr"/>
-            <a:endParaRPr lang="en-US" dirty="0"/>
-          </a:p>
-        </p:txBody>
-      </p:sp>
-      <p:sp>
-        <p:nvSpPr>
-          <p:cNvPr id="31" name="Oval 30">
-            <a:extLst>
-              <a:ext uri="{FF2B5EF4-FFF2-40B4-BE49-F238E27FC236}">
-                <a16:creationId xmlns:a16="http://schemas.microsoft.com/office/drawing/2014/main" id="{89E9FAB6-D33B-058A-98D4-0AB6F514E822}"/>
-              </a:ext>
-            </a:extLst>
-          </p:cNvPr>
-          <p:cNvSpPr>
-            <a:spLocks noChangeAspect="1"/>
-          </p:cNvSpPr>
-          <p:nvPr/>
-        </p:nvSpPr>
-        <p:spPr>
-          <a:xfrm>
-            <a:off x="4346949" y="1605847"/>
+            <a:off x="5141160" y="1605847"/>
             <a:ext cx="206893" cy="205856"/>
           </a:xfrm>
           <a:prstGeom prst="ellipse">
@@ -4590,7 +4386,7 @@
       </p:sp>
       <p:sp>
         <p:nvSpPr>
-          <p:cNvPr id="32" name="Oval 31">
+          <p:cNvPr id="33" name="Oval 32">
             <a:extLst>
               <a:ext uri="{FF2B5EF4-FFF2-40B4-BE49-F238E27FC236}">
                 <a16:creationId xmlns:a16="http://schemas.microsoft.com/office/drawing/2014/main" id="{89E9FAB6-D33B-058A-98D4-0AB6F514E822}"/>
@@ -4604,7 +4400,7 @@
         </p:nvSpPr>
         <p:spPr>
           <a:xfrm>
-            <a:off x="5140645" y="1605847"/>
+            <a:off x="5896742" y="1605847"/>
             <a:ext cx="206893" cy="205856"/>
           </a:xfrm>
           <a:prstGeom prst="ellipse">
@@ -4738,7 +4534,7 @@
       </p:sp>
       <p:sp>
         <p:nvSpPr>
-          <p:cNvPr id="33" name="Oval 32">
+          <p:cNvPr id="24" name="Oval 23">
             <a:extLst>
               <a:ext uri="{FF2B5EF4-FFF2-40B4-BE49-F238E27FC236}">
                 <a16:creationId xmlns:a16="http://schemas.microsoft.com/office/drawing/2014/main" id="{89E9FAB6-D33B-058A-98D4-0AB6F514E822}"/>
@@ -4752,7 +4548,516 @@
         </p:nvSpPr>
         <p:spPr>
           <a:xfrm>
-            <a:off x="5883513" y="1605847"/>
+            <a:off x="939735" y="2293744"/>
+            <a:ext cx="206893" cy="205856"/>
+          </a:xfrm>
+          <a:prstGeom prst="ellipse">
+            <a:avLst/>
+          </a:prstGeom>
+          <a:solidFill>
+            <a:schemeClr val="accent2">
+              <a:alpha val="69013"/>
+            </a:schemeClr>
+          </a:solidFill>
+          <a:ln>
+            <a:noFill/>
+          </a:ln>
+        </p:spPr>
+        <p:style>
+          <a:lnRef idx="2">
+            <a:schemeClr val="accent1">
+              <a:shade val="50000"/>
+            </a:schemeClr>
+          </a:lnRef>
+          <a:fillRef idx="1">
+            <a:schemeClr val="accent1"/>
+          </a:fillRef>
+          <a:effectRef idx="0">
+            <a:schemeClr val="accent1"/>
+          </a:effectRef>
+          <a:fontRef idx="minor">
+            <a:schemeClr val="lt1"/>
+          </a:fontRef>
+        </p:style>
+        <p:txBody>
+          <a:bodyPr rtlCol="0" anchor="ctr"/>
+          <a:lstStyle/>
+          <a:p>
+            <a:pPr algn="ctr"/>
+            <a:endParaRPr lang="en-US" dirty="0"/>
+          </a:p>
+        </p:txBody>
+      </p:sp>
+      <p:sp>
+        <p:nvSpPr>
+          <p:cNvPr id="28" name="Oval 27">
+            <a:extLst>
+              <a:ext uri="{FF2B5EF4-FFF2-40B4-BE49-F238E27FC236}">
+                <a16:creationId xmlns:a16="http://schemas.microsoft.com/office/drawing/2014/main" id="{89E9FAB6-D33B-058A-98D4-0AB6F514E822}"/>
+              </a:ext>
+            </a:extLst>
+          </p:cNvPr>
+          <p:cNvSpPr>
+            <a:spLocks noChangeAspect="1"/>
+          </p:cNvSpPr>
+          <p:nvPr/>
+        </p:nvSpPr>
+        <p:spPr>
+          <a:xfrm>
+            <a:off x="1920420" y="2293744"/>
+            <a:ext cx="206893" cy="205856"/>
+          </a:xfrm>
+          <a:prstGeom prst="ellipse">
+            <a:avLst/>
+          </a:prstGeom>
+          <a:solidFill>
+            <a:schemeClr val="accent4">
+              <a:lumMod val="60000"/>
+              <a:lumOff val="40000"/>
+              <a:alpha val="69013"/>
+            </a:schemeClr>
+          </a:solidFill>
+          <a:ln>
+            <a:noFill/>
+          </a:ln>
+        </p:spPr>
+        <p:style>
+          <a:lnRef idx="2">
+            <a:schemeClr val="accent1">
+              <a:shade val="50000"/>
+            </a:schemeClr>
+          </a:lnRef>
+          <a:fillRef idx="1">
+            <a:schemeClr val="accent1"/>
+          </a:fillRef>
+          <a:effectRef idx="0">
+            <a:schemeClr val="accent1"/>
+          </a:effectRef>
+          <a:fontRef idx="minor">
+            <a:schemeClr val="lt1"/>
+          </a:fontRef>
+        </p:style>
+        <p:txBody>
+          <a:bodyPr rtlCol="0" anchor="ctr"/>
+          <a:lstStyle>
+            <a:defPPr>
+              <a:defRPr lang="en-US"/>
+            </a:defPPr>
+            <a:lvl1pPr marL="0" algn="l" defTabSz="914400" rtl="0" eaLnBrk="1" latinLnBrk="0" hangingPunct="1">
+              <a:defRPr sz="1800" kern="1200">
+                <a:solidFill>
+                  <a:schemeClr val="lt1"/>
+                </a:solidFill>
+                <a:latin typeface="+mn-lt"/>
+                <a:ea typeface="+mn-ea"/>
+                <a:cs typeface="+mn-cs"/>
+              </a:defRPr>
+            </a:lvl1pPr>
+            <a:lvl2pPr marL="457200" algn="l" defTabSz="914400" rtl="0" eaLnBrk="1" latinLnBrk="0" hangingPunct="1">
+              <a:defRPr sz="1800" kern="1200">
+                <a:solidFill>
+                  <a:schemeClr val="lt1"/>
+                </a:solidFill>
+                <a:latin typeface="+mn-lt"/>
+                <a:ea typeface="+mn-ea"/>
+                <a:cs typeface="+mn-cs"/>
+              </a:defRPr>
+            </a:lvl2pPr>
+            <a:lvl3pPr marL="914400" algn="l" defTabSz="914400" rtl="0" eaLnBrk="1" latinLnBrk="0" hangingPunct="1">
+              <a:defRPr sz="1800" kern="1200">
+                <a:solidFill>
+                  <a:schemeClr val="lt1"/>
+                </a:solidFill>
+                <a:latin typeface="+mn-lt"/>
+                <a:ea typeface="+mn-ea"/>
+                <a:cs typeface="+mn-cs"/>
+              </a:defRPr>
+            </a:lvl3pPr>
+            <a:lvl4pPr marL="1371600" algn="l" defTabSz="914400" rtl="0" eaLnBrk="1" latinLnBrk="0" hangingPunct="1">
+              <a:defRPr sz="1800" kern="1200">
+                <a:solidFill>
+                  <a:schemeClr val="lt1"/>
+                </a:solidFill>
+                <a:latin typeface="+mn-lt"/>
+                <a:ea typeface="+mn-ea"/>
+                <a:cs typeface="+mn-cs"/>
+              </a:defRPr>
+            </a:lvl4pPr>
+            <a:lvl5pPr marL="1828800" algn="l" defTabSz="914400" rtl="0" eaLnBrk="1" latinLnBrk="0" hangingPunct="1">
+              <a:defRPr sz="1800" kern="1200">
+                <a:solidFill>
+                  <a:schemeClr val="lt1"/>
+                </a:solidFill>
+                <a:latin typeface="+mn-lt"/>
+                <a:ea typeface="+mn-ea"/>
+                <a:cs typeface="+mn-cs"/>
+              </a:defRPr>
+            </a:lvl5pPr>
+            <a:lvl6pPr marL="2286000" algn="l" defTabSz="914400" rtl="0" eaLnBrk="1" latinLnBrk="0" hangingPunct="1">
+              <a:defRPr sz="1800" kern="1200">
+                <a:solidFill>
+                  <a:schemeClr val="lt1"/>
+                </a:solidFill>
+                <a:latin typeface="+mn-lt"/>
+                <a:ea typeface="+mn-ea"/>
+                <a:cs typeface="+mn-cs"/>
+              </a:defRPr>
+            </a:lvl6pPr>
+            <a:lvl7pPr marL="2743200" algn="l" defTabSz="914400" rtl="0" eaLnBrk="1" latinLnBrk="0" hangingPunct="1">
+              <a:defRPr sz="1800" kern="1200">
+                <a:solidFill>
+                  <a:schemeClr val="lt1"/>
+                </a:solidFill>
+                <a:latin typeface="+mn-lt"/>
+                <a:ea typeface="+mn-ea"/>
+                <a:cs typeface="+mn-cs"/>
+              </a:defRPr>
+            </a:lvl7pPr>
+            <a:lvl8pPr marL="3200400" algn="l" defTabSz="914400" rtl="0" eaLnBrk="1" latinLnBrk="0" hangingPunct="1">
+              <a:defRPr sz="1800" kern="1200">
+                <a:solidFill>
+                  <a:schemeClr val="lt1"/>
+                </a:solidFill>
+                <a:latin typeface="+mn-lt"/>
+                <a:ea typeface="+mn-ea"/>
+                <a:cs typeface="+mn-cs"/>
+              </a:defRPr>
+            </a:lvl8pPr>
+            <a:lvl9pPr marL="3657600" algn="l" defTabSz="914400" rtl="0" eaLnBrk="1" latinLnBrk="0" hangingPunct="1">
+              <a:defRPr sz="1800" kern="1200">
+                <a:solidFill>
+                  <a:schemeClr val="lt1"/>
+                </a:solidFill>
+                <a:latin typeface="+mn-lt"/>
+                <a:ea typeface="+mn-ea"/>
+                <a:cs typeface="+mn-cs"/>
+              </a:defRPr>
+            </a:lvl9pPr>
+          </a:lstStyle>
+          <a:p>
+            <a:pPr algn="ctr"/>
+            <a:endParaRPr lang="en-US" dirty="0"/>
+          </a:p>
+        </p:txBody>
+      </p:sp>
+      <p:sp>
+        <p:nvSpPr>
+          <p:cNvPr id="30" name="Oval 29">
+            <a:extLst>
+              <a:ext uri="{FF2B5EF4-FFF2-40B4-BE49-F238E27FC236}">
+                <a16:creationId xmlns:a16="http://schemas.microsoft.com/office/drawing/2014/main" id="{89E9FAB6-D33B-058A-98D4-0AB6F514E822}"/>
+              </a:ext>
+            </a:extLst>
+          </p:cNvPr>
+          <p:cNvSpPr>
+            <a:spLocks noChangeAspect="1"/>
+          </p:cNvSpPr>
+          <p:nvPr/>
+        </p:nvSpPr>
+        <p:spPr>
+          <a:xfrm>
+            <a:off x="2949538" y="2293744"/>
+            <a:ext cx="206893" cy="205856"/>
+          </a:xfrm>
+          <a:prstGeom prst="ellipse">
+            <a:avLst/>
+          </a:prstGeom>
+          <a:solidFill>
+            <a:schemeClr val="accent2">
+              <a:alpha val="69013"/>
+            </a:schemeClr>
+          </a:solidFill>
+          <a:ln>
+            <a:noFill/>
+          </a:ln>
+        </p:spPr>
+        <p:style>
+          <a:lnRef idx="2">
+            <a:schemeClr val="accent1">
+              <a:shade val="50000"/>
+            </a:schemeClr>
+          </a:lnRef>
+          <a:fillRef idx="1">
+            <a:schemeClr val="accent1"/>
+          </a:fillRef>
+          <a:effectRef idx="0">
+            <a:schemeClr val="accent1"/>
+          </a:effectRef>
+          <a:fontRef idx="minor">
+            <a:schemeClr val="lt1"/>
+          </a:fontRef>
+        </p:style>
+        <p:txBody>
+          <a:bodyPr rtlCol="0" anchor="ctr"/>
+          <a:lstStyle>
+            <a:defPPr>
+              <a:defRPr lang="en-US"/>
+            </a:defPPr>
+            <a:lvl1pPr marL="0" algn="l" defTabSz="914400" rtl="0" eaLnBrk="1" latinLnBrk="0" hangingPunct="1">
+              <a:defRPr sz="1800" kern="1200">
+                <a:solidFill>
+                  <a:schemeClr val="lt1"/>
+                </a:solidFill>
+                <a:latin typeface="+mn-lt"/>
+                <a:ea typeface="+mn-ea"/>
+                <a:cs typeface="+mn-cs"/>
+              </a:defRPr>
+            </a:lvl1pPr>
+            <a:lvl2pPr marL="457200" algn="l" defTabSz="914400" rtl="0" eaLnBrk="1" latinLnBrk="0" hangingPunct="1">
+              <a:defRPr sz="1800" kern="1200">
+                <a:solidFill>
+                  <a:schemeClr val="lt1"/>
+                </a:solidFill>
+                <a:latin typeface="+mn-lt"/>
+                <a:ea typeface="+mn-ea"/>
+                <a:cs typeface="+mn-cs"/>
+              </a:defRPr>
+            </a:lvl2pPr>
+            <a:lvl3pPr marL="914400" algn="l" defTabSz="914400" rtl="0" eaLnBrk="1" latinLnBrk="0" hangingPunct="1">
+              <a:defRPr sz="1800" kern="1200">
+                <a:solidFill>
+                  <a:schemeClr val="lt1"/>
+                </a:solidFill>
+                <a:latin typeface="+mn-lt"/>
+                <a:ea typeface="+mn-ea"/>
+                <a:cs typeface="+mn-cs"/>
+              </a:defRPr>
+            </a:lvl3pPr>
+            <a:lvl4pPr marL="1371600" algn="l" defTabSz="914400" rtl="0" eaLnBrk="1" latinLnBrk="0" hangingPunct="1">
+              <a:defRPr sz="1800" kern="1200">
+                <a:solidFill>
+                  <a:schemeClr val="lt1"/>
+                </a:solidFill>
+                <a:latin typeface="+mn-lt"/>
+                <a:ea typeface="+mn-ea"/>
+                <a:cs typeface="+mn-cs"/>
+              </a:defRPr>
+            </a:lvl4pPr>
+            <a:lvl5pPr marL="1828800" algn="l" defTabSz="914400" rtl="0" eaLnBrk="1" latinLnBrk="0" hangingPunct="1">
+              <a:defRPr sz="1800" kern="1200">
+                <a:solidFill>
+                  <a:schemeClr val="lt1"/>
+                </a:solidFill>
+                <a:latin typeface="+mn-lt"/>
+                <a:ea typeface="+mn-ea"/>
+                <a:cs typeface="+mn-cs"/>
+              </a:defRPr>
+            </a:lvl5pPr>
+            <a:lvl6pPr marL="2286000" algn="l" defTabSz="914400" rtl="0" eaLnBrk="1" latinLnBrk="0" hangingPunct="1">
+              <a:defRPr sz="1800" kern="1200">
+                <a:solidFill>
+                  <a:schemeClr val="lt1"/>
+                </a:solidFill>
+                <a:latin typeface="+mn-lt"/>
+                <a:ea typeface="+mn-ea"/>
+                <a:cs typeface="+mn-cs"/>
+              </a:defRPr>
+            </a:lvl6pPr>
+            <a:lvl7pPr marL="2743200" algn="l" defTabSz="914400" rtl="0" eaLnBrk="1" latinLnBrk="0" hangingPunct="1">
+              <a:defRPr sz="1800" kern="1200">
+                <a:solidFill>
+                  <a:schemeClr val="lt1"/>
+                </a:solidFill>
+                <a:latin typeface="+mn-lt"/>
+                <a:ea typeface="+mn-ea"/>
+                <a:cs typeface="+mn-cs"/>
+              </a:defRPr>
+            </a:lvl7pPr>
+            <a:lvl8pPr marL="3200400" algn="l" defTabSz="914400" rtl="0" eaLnBrk="1" latinLnBrk="0" hangingPunct="1">
+              <a:defRPr sz="1800" kern="1200">
+                <a:solidFill>
+                  <a:schemeClr val="lt1"/>
+                </a:solidFill>
+                <a:latin typeface="+mn-lt"/>
+                <a:ea typeface="+mn-ea"/>
+                <a:cs typeface="+mn-cs"/>
+              </a:defRPr>
+            </a:lvl8pPr>
+            <a:lvl9pPr marL="3657600" algn="l" defTabSz="914400" rtl="0" eaLnBrk="1" latinLnBrk="0" hangingPunct="1">
+              <a:defRPr sz="1800" kern="1200">
+                <a:solidFill>
+                  <a:schemeClr val="lt1"/>
+                </a:solidFill>
+                <a:latin typeface="+mn-lt"/>
+                <a:ea typeface="+mn-ea"/>
+                <a:cs typeface="+mn-cs"/>
+              </a:defRPr>
+            </a:lvl9pPr>
+          </a:lstStyle>
+          <a:p>
+            <a:pPr algn="ctr"/>
+            <a:endParaRPr lang="en-US" dirty="0"/>
+          </a:p>
+        </p:txBody>
+      </p:sp>
+      <p:sp>
+        <p:nvSpPr>
+          <p:cNvPr id="34" name="Oval 33">
+            <a:extLst>
+              <a:ext uri="{FF2B5EF4-FFF2-40B4-BE49-F238E27FC236}">
+                <a16:creationId xmlns:a16="http://schemas.microsoft.com/office/drawing/2014/main" id="{89E9FAB6-D33B-058A-98D4-0AB6F514E822}"/>
+              </a:ext>
+            </a:extLst>
+          </p:cNvPr>
+          <p:cNvSpPr>
+            <a:spLocks noChangeAspect="1"/>
+          </p:cNvSpPr>
+          <p:nvPr/>
+        </p:nvSpPr>
+        <p:spPr>
+          <a:xfrm>
+            <a:off x="4346948" y="2952912"/>
+            <a:ext cx="206893" cy="205856"/>
+          </a:xfrm>
+          <a:prstGeom prst="ellipse">
+            <a:avLst/>
+          </a:prstGeom>
+          <a:solidFill>
+            <a:schemeClr val="accent2">
+              <a:lumMod val="50000"/>
+              <a:alpha val="69013"/>
+            </a:schemeClr>
+          </a:solidFill>
+          <a:ln>
+            <a:noFill/>
+          </a:ln>
+        </p:spPr>
+        <p:style>
+          <a:lnRef idx="2">
+            <a:schemeClr val="accent1">
+              <a:shade val="50000"/>
+            </a:schemeClr>
+          </a:lnRef>
+          <a:fillRef idx="1">
+            <a:schemeClr val="accent1"/>
+          </a:fillRef>
+          <a:effectRef idx="0">
+            <a:schemeClr val="accent1"/>
+          </a:effectRef>
+          <a:fontRef idx="minor">
+            <a:schemeClr val="lt1"/>
+          </a:fontRef>
+        </p:style>
+        <p:txBody>
+          <a:bodyPr rtlCol="0" anchor="ctr"/>
+          <a:lstStyle>
+            <a:defPPr>
+              <a:defRPr lang="en-US"/>
+            </a:defPPr>
+            <a:lvl1pPr marL="0" algn="l" defTabSz="914400" rtl="0" eaLnBrk="1" latinLnBrk="0" hangingPunct="1">
+              <a:defRPr sz="1800" kern="1200">
+                <a:solidFill>
+                  <a:schemeClr val="lt1"/>
+                </a:solidFill>
+                <a:latin typeface="+mn-lt"/>
+                <a:ea typeface="+mn-ea"/>
+                <a:cs typeface="+mn-cs"/>
+              </a:defRPr>
+            </a:lvl1pPr>
+            <a:lvl2pPr marL="457200" algn="l" defTabSz="914400" rtl="0" eaLnBrk="1" latinLnBrk="0" hangingPunct="1">
+              <a:defRPr sz="1800" kern="1200">
+                <a:solidFill>
+                  <a:schemeClr val="lt1"/>
+                </a:solidFill>
+                <a:latin typeface="+mn-lt"/>
+                <a:ea typeface="+mn-ea"/>
+                <a:cs typeface="+mn-cs"/>
+              </a:defRPr>
+            </a:lvl2pPr>
+            <a:lvl3pPr marL="914400" algn="l" defTabSz="914400" rtl="0" eaLnBrk="1" latinLnBrk="0" hangingPunct="1">
+              <a:defRPr sz="1800" kern="1200">
+                <a:solidFill>
+                  <a:schemeClr val="lt1"/>
+                </a:solidFill>
+                <a:latin typeface="+mn-lt"/>
+                <a:ea typeface="+mn-ea"/>
+                <a:cs typeface="+mn-cs"/>
+              </a:defRPr>
+            </a:lvl3pPr>
+            <a:lvl4pPr marL="1371600" algn="l" defTabSz="914400" rtl="0" eaLnBrk="1" latinLnBrk="0" hangingPunct="1">
+              <a:defRPr sz="1800" kern="1200">
+                <a:solidFill>
+                  <a:schemeClr val="lt1"/>
+                </a:solidFill>
+                <a:latin typeface="+mn-lt"/>
+                <a:ea typeface="+mn-ea"/>
+                <a:cs typeface="+mn-cs"/>
+              </a:defRPr>
+            </a:lvl4pPr>
+            <a:lvl5pPr marL="1828800" algn="l" defTabSz="914400" rtl="0" eaLnBrk="1" latinLnBrk="0" hangingPunct="1">
+              <a:defRPr sz="1800" kern="1200">
+                <a:solidFill>
+                  <a:schemeClr val="lt1"/>
+                </a:solidFill>
+                <a:latin typeface="+mn-lt"/>
+                <a:ea typeface="+mn-ea"/>
+                <a:cs typeface="+mn-cs"/>
+              </a:defRPr>
+            </a:lvl5pPr>
+            <a:lvl6pPr marL="2286000" algn="l" defTabSz="914400" rtl="0" eaLnBrk="1" latinLnBrk="0" hangingPunct="1">
+              <a:defRPr sz="1800" kern="1200">
+                <a:solidFill>
+                  <a:schemeClr val="lt1"/>
+                </a:solidFill>
+                <a:latin typeface="+mn-lt"/>
+                <a:ea typeface="+mn-ea"/>
+                <a:cs typeface="+mn-cs"/>
+              </a:defRPr>
+            </a:lvl6pPr>
+            <a:lvl7pPr marL="2743200" algn="l" defTabSz="914400" rtl="0" eaLnBrk="1" latinLnBrk="0" hangingPunct="1">
+              <a:defRPr sz="1800" kern="1200">
+                <a:solidFill>
+                  <a:schemeClr val="lt1"/>
+                </a:solidFill>
+                <a:latin typeface="+mn-lt"/>
+                <a:ea typeface="+mn-ea"/>
+                <a:cs typeface="+mn-cs"/>
+              </a:defRPr>
+            </a:lvl7pPr>
+            <a:lvl8pPr marL="3200400" algn="l" defTabSz="914400" rtl="0" eaLnBrk="1" latinLnBrk="0" hangingPunct="1">
+              <a:defRPr sz="1800" kern="1200">
+                <a:solidFill>
+                  <a:schemeClr val="lt1"/>
+                </a:solidFill>
+                <a:latin typeface="+mn-lt"/>
+                <a:ea typeface="+mn-ea"/>
+                <a:cs typeface="+mn-cs"/>
+              </a:defRPr>
+            </a:lvl8pPr>
+            <a:lvl9pPr marL="3657600" algn="l" defTabSz="914400" rtl="0" eaLnBrk="1" latinLnBrk="0" hangingPunct="1">
+              <a:defRPr sz="1800" kern="1200">
+                <a:solidFill>
+                  <a:schemeClr val="lt1"/>
+                </a:solidFill>
+                <a:latin typeface="+mn-lt"/>
+                <a:ea typeface="+mn-ea"/>
+                <a:cs typeface="+mn-cs"/>
+              </a:defRPr>
+            </a:lvl9pPr>
+          </a:lstStyle>
+          <a:p>
+            <a:pPr algn="ctr"/>
+            <a:endParaRPr lang="en-US" dirty="0"/>
+          </a:p>
+        </p:txBody>
+      </p:sp>
+      <p:sp>
+        <p:nvSpPr>
+          <p:cNvPr id="35" name="Oval 34">
+            <a:extLst>
+              <a:ext uri="{FF2B5EF4-FFF2-40B4-BE49-F238E27FC236}">
+                <a16:creationId xmlns:a16="http://schemas.microsoft.com/office/drawing/2014/main" id="{89E9FAB6-D33B-058A-98D4-0AB6F514E822}"/>
+              </a:ext>
+            </a:extLst>
+          </p:cNvPr>
+          <p:cNvSpPr>
+            <a:spLocks noChangeAspect="1"/>
+          </p:cNvSpPr>
+          <p:nvPr/>
+        </p:nvSpPr>
+        <p:spPr>
+          <a:xfrm>
+            <a:off x="5153502" y="2954269"/>
             <a:ext cx="206893" cy="205856"/>
           </a:xfrm>
           <a:prstGeom prst="ellipse">
@@ -4886,7 +5191,7 @@
       </p:sp>
       <p:sp>
         <p:nvSpPr>
-          <p:cNvPr id="34" name="Oval 33">
+          <p:cNvPr id="36" name="Oval 35">
             <a:extLst>
               <a:ext uri="{FF2B5EF4-FFF2-40B4-BE49-F238E27FC236}">
                 <a16:creationId xmlns:a16="http://schemas.microsoft.com/office/drawing/2014/main" id="{89E9FAB6-D33B-058A-98D4-0AB6F514E822}"/>
@@ -4900,20 +5205,21 @@
         </p:nvSpPr>
         <p:spPr>
           <a:xfrm>
-            <a:off x="4330909" y="2965076"/>
+            <a:off x="5891939" y="2950404"/>
             <a:ext cx="206893" cy="205856"/>
           </a:xfrm>
           <a:prstGeom prst="ellipse">
             <a:avLst/>
           </a:prstGeom>
           <a:solidFill>
-            <a:schemeClr val="accent2">
-              <a:lumMod val="60000"/>
-              <a:lumOff val="40000"/>
-            </a:schemeClr>
+            <a:schemeClr val="accent6"/>
           </a:solidFill>
           <a:ln>
-            <a:noFill/>
+            <a:solidFill>
+              <a:schemeClr val="accent1">
+                <a:shade val="50000"/>
+              </a:schemeClr>
+            </a:solidFill>
           </a:ln>
         </p:spPr>
         <p:style>
@@ -5037,7 +5343,7 @@
       </p:sp>
       <p:sp>
         <p:nvSpPr>
-          <p:cNvPr id="35" name="Oval 34">
+          <p:cNvPr id="37" name="Oval 36">
             <a:extLst>
               <a:ext uri="{FF2B5EF4-FFF2-40B4-BE49-F238E27FC236}">
                 <a16:creationId xmlns:a16="http://schemas.microsoft.com/office/drawing/2014/main" id="{89E9FAB6-D33B-058A-98D4-0AB6F514E822}"/>
@@ -5051,7 +5357,159 @@
         </p:nvSpPr>
         <p:spPr>
           <a:xfrm>
-            <a:off x="5156685" y="2981118"/>
+            <a:off x="6698316" y="2949733"/>
+            <a:ext cx="206893" cy="205856"/>
+          </a:xfrm>
+          <a:prstGeom prst="ellipse">
+            <a:avLst/>
+          </a:prstGeom>
+          <a:solidFill>
+            <a:schemeClr val="accent6"/>
+          </a:solidFill>
+          <a:ln>
+            <a:solidFill>
+              <a:schemeClr val="accent1">
+                <a:shade val="50000"/>
+              </a:schemeClr>
+            </a:solidFill>
+          </a:ln>
+        </p:spPr>
+        <p:style>
+          <a:lnRef idx="2">
+            <a:schemeClr val="accent1">
+              <a:shade val="50000"/>
+            </a:schemeClr>
+          </a:lnRef>
+          <a:fillRef idx="1">
+            <a:schemeClr val="accent1"/>
+          </a:fillRef>
+          <a:effectRef idx="0">
+            <a:schemeClr val="accent1"/>
+          </a:effectRef>
+          <a:fontRef idx="minor">
+            <a:schemeClr val="lt1"/>
+          </a:fontRef>
+        </p:style>
+        <p:txBody>
+          <a:bodyPr rtlCol="0" anchor="ctr"/>
+          <a:lstStyle>
+            <a:defPPr>
+              <a:defRPr lang="en-US"/>
+            </a:defPPr>
+            <a:lvl1pPr marL="0" algn="l" defTabSz="914400" rtl="0" eaLnBrk="1" latinLnBrk="0" hangingPunct="1">
+              <a:defRPr sz="1800" kern="1200">
+                <a:solidFill>
+                  <a:schemeClr val="lt1"/>
+                </a:solidFill>
+                <a:latin typeface="+mn-lt"/>
+                <a:ea typeface="+mn-ea"/>
+                <a:cs typeface="+mn-cs"/>
+              </a:defRPr>
+            </a:lvl1pPr>
+            <a:lvl2pPr marL="457200" algn="l" defTabSz="914400" rtl="0" eaLnBrk="1" latinLnBrk="0" hangingPunct="1">
+              <a:defRPr sz="1800" kern="1200">
+                <a:solidFill>
+                  <a:schemeClr val="lt1"/>
+                </a:solidFill>
+                <a:latin typeface="+mn-lt"/>
+                <a:ea typeface="+mn-ea"/>
+                <a:cs typeface="+mn-cs"/>
+              </a:defRPr>
+            </a:lvl2pPr>
+            <a:lvl3pPr marL="914400" algn="l" defTabSz="914400" rtl="0" eaLnBrk="1" latinLnBrk="0" hangingPunct="1">
+              <a:defRPr sz="1800" kern="1200">
+                <a:solidFill>
+                  <a:schemeClr val="lt1"/>
+                </a:solidFill>
+                <a:latin typeface="+mn-lt"/>
+                <a:ea typeface="+mn-ea"/>
+                <a:cs typeface="+mn-cs"/>
+              </a:defRPr>
+            </a:lvl3pPr>
+            <a:lvl4pPr marL="1371600" algn="l" defTabSz="914400" rtl="0" eaLnBrk="1" latinLnBrk="0" hangingPunct="1">
+              <a:defRPr sz="1800" kern="1200">
+                <a:solidFill>
+                  <a:schemeClr val="lt1"/>
+                </a:solidFill>
+                <a:latin typeface="+mn-lt"/>
+                <a:ea typeface="+mn-ea"/>
+                <a:cs typeface="+mn-cs"/>
+              </a:defRPr>
+            </a:lvl4pPr>
+            <a:lvl5pPr marL="1828800" algn="l" defTabSz="914400" rtl="0" eaLnBrk="1" latinLnBrk="0" hangingPunct="1">
+              <a:defRPr sz="1800" kern="1200">
+                <a:solidFill>
+                  <a:schemeClr val="lt1"/>
+                </a:solidFill>
+                <a:latin typeface="+mn-lt"/>
+                <a:ea typeface="+mn-ea"/>
+                <a:cs typeface="+mn-cs"/>
+              </a:defRPr>
+            </a:lvl5pPr>
+            <a:lvl6pPr marL="2286000" algn="l" defTabSz="914400" rtl="0" eaLnBrk="1" latinLnBrk="0" hangingPunct="1">
+              <a:defRPr sz="1800" kern="1200">
+                <a:solidFill>
+                  <a:schemeClr val="lt1"/>
+                </a:solidFill>
+                <a:latin typeface="+mn-lt"/>
+                <a:ea typeface="+mn-ea"/>
+                <a:cs typeface="+mn-cs"/>
+              </a:defRPr>
+            </a:lvl6pPr>
+            <a:lvl7pPr marL="2743200" algn="l" defTabSz="914400" rtl="0" eaLnBrk="1" latinLnBrk="0" hangingPunct="1">
+              <a:defRPr sz="1800" kern="1200">
+                <a:solidFill>
+                  <a:schemeClr val="lt1"/>
+                </a:solidFill>
+                <a:latin typeface="+mn-lt"/>
+                <a:ea typeface="+mn-ea"/>
+                <a:cs typeface="+mn-cs"/>
+              </a:defRPr>
+            </a:lvl7pPr>
+            <a:lvl8pPr marL="3200400" algn="l" defTabSz="914400" rtl="0" eaLnBrk="1" latinLnBrk="0" hangingPunct="1">
+              <a:defRPr sz="1800" kern="1200">
+                <a:solidFill>
+                  <a:schemeClr val="lt1"/>
+                </a:solidFill>
+                <a:latin typeface="+mn-lt"/>
+                <a:ea typeface="+mn-ea"/>
+                <a:cs typeface="+mn-cs"/>
+              </a:defRPr>
+            </a:lvl8pPr>
+            <a:lvl9pPr marL="3657600" algn="l" defTabSz="914400" rtl="0" eaLnBrk="1" latinLnBrk="0" hangingPunct="1">
+              <a:defRPr sz="1800" kern="1200">
+                <a:solidFill>
+                  <a:schemeClr val="lt1"/>
+                </a:solidFill>
+                <a:latin typeface="+mn-lt"/>
+                <a:ea typeface="+mn-ea"/>
+                <a:cs typeface="+mn-cs"/>
+              </a:defRPr>
+            </a:lvl9pPr>
+          </a:lstStyle>
+          <a:p>
+            <a:pPr algn="ctr"/>
+            <a:endParaRPr lang="en-US" dirty="0"/>
+          </a:p>
+        </p:txBody>
+      </p:sp>
+      <p:sp>
+        <p:nvSpPr>
+          <p:cNvPr id="38" name="Oval 37">
+            <a:extLst>
+              <a:ext uri="{FF2B5EF4-FFF2-40B4-BE49-F238E27FC236}">
+                <a16:creationId xmlns:a16="http://schemas.microsoft.com/office/drawing/2014/main" id="{89E9FAB6-D33B-058A-98D4-0AB6F514E822}"/>
+              </a:ext>
+            </a:extLst>
+          </p:cNvPr>
+          <p:cNvSpPr>
+            <a:spLocks noChangeAspect="1"/>
+          </p:cNvSpPr>
+          <p:nvPr/>
+        </p:nvSpPr>
+        <p:spPr>
+          <a:xfrm>
+            <a:off x="7585759" y="2965076"/>
             <a:ext cx="206893" cy="205856"/>
           </a:xfrm>
           <a:prstGeom prst="ellipse">
@@ -5185,7 +5643,7 @@
       </p:sp>
       <p:sp>
         <p:nvSpPr>
-          <p:cNvPr id="36" name="Oval 35">
+          <p:cNvPr id="39" name="Oval 38">
             <a:extLst>
               <a:ext uri="{FF2B5EF4-FFF2-40B4-BE49-F238E27FC236}">
                 <a16:creationId xmlns:a16="http://schemas.microsoft.com/office/drawing/2014/main" id="{89E9FAB6-D33B-058A-98D4-0AB6F514E822}"/>
@@ -5199,7 +5657,7 @@
         </p:nvSpPr>
         <p:spPr>
           <a:xfrm>
-            <a:off x="5883509" y="2981118"/>
+            <a:off x="8500770" y="2960746"/>
             <a:ext cx="206893" cy="205856"/>
           </a:xfrm>
           <a:prstGeom prst="ellipse">
@@ -5333,7 +5791,7 @@
       </p:sp>
       <p:sp>
         <p:nvSpPr>
-          <p:cNvPr id="37" name="Oval 36">
+          <p:cNvPr id="40" name="Oval 39">
             <a:extLst>
               <a:ext uri="{FF2B5EF4-FFF2-40B4-BE49-F238E27FC236}">
                 <a16:creationId xmlns:a16="http://schemas.microsoft.com/office/drawing/2014/main" id="{89E9FAB6-D33B-058A-98D4-0AB6F514E822}"/>
@@ -5347,7 +5805,7 @@
         </p:nvSpPr>
         <p:spPr>
           <a:xfrm>
-            <a:off x="6779277" y="2971593"/>
+            <a:off x="6698408" y="1605847"/>
             <a:ext cx="206893" cy="205856"/>
           </a:xfrm>
           <a:prstGeom prst="ellipse">
@@ -5481,7 +5939,7 @@
       </p:sp>
       <p:sp>
         <p:nvSpPr>
-          <p:cNvPr id="38" name="Oval 37">
+          <p:cNvPr id="41" name="Oval 40">
             <a:extLst>
               <a:ext uri="{FF2B5EF4-FFF2-40B4-BE49-F238E27FC236}">
                 <a16:creationId xmlns:a16="http://schemas.microsoft.com/office/drawing/2014/main" id="{89E9FAB6-D33B-058A-98D4-0AB6F514E822}"/>
@@ -5495,7 +5953,7 @@
         </p:nvSpPr>
         <p:spPr>
           <a:xfrm>
-            <a:off x="7759962" y="2971593"/>
+            <a:off x="7584151" y="1605847"/>
             <a:ext cx="206893" cy="205856"/>
           </a:xfrm>
           <a:prstGeom prst="ellipse">
@@ -5629,7 +6087,7 @@
       </p:sp>
       <p:sp>
         <p:nvSpPr>
-          <p:cNvPr id="39" name="Oval 38">
+          <p:cNvPr id="42" name="Oval 41">
             <a:extLst>
               <a:ext uri="{FF2B5EF4-FFF2-40B4-BE49-F238E27FC236}">
                 <a16:creationId xmlns:a16="http://schemas.microsoft.com/office/drawing/2014/main" id="{89E9FAB6-D33B-058A-98D4-0AB6F514E822}"/>
@@ -5643,14 +6101,17 @@
         </p:nvSpPr>
         <p:spPr>
           <a:xfrm>
-            <a:off x="8789080" y="2971593"/>
+            <a:off x="8500771" y="1605847"/>
             <a:ext cx="206893" cy="205856"/>
           </a:xfrm>
           <a:prstGeom prst="ellipse">
             <a:avLst/>
           </a:prstGeom>
           <a:solidFill>
-            <a:schemeClr val="accent6"/>
+            <a:schemeClr val="accent6">
+              <a:lumMod val="40000"/>
+              <a:lumOff val="60000"/>
+            </a:schemeClr>
           </a:solidFill>
           <a:ln>
             <a:noFill/>
@@ -5777,28 +6238,194 @@
       </p:sp>
       <p:sp>
         <p:nvSpPr>
-          <p:cNvPr id="40" name="Oval 39">
-            <a:extLst>
-              <a:ext uri="{FF2B5EF4-FFF2-40B4-BE49-F238E27FC236}">
-                <a16:creationId xmlns:a16="http://schemas.microsoft.com/office/drawing/2014/main" id="{89E9FAB6-D33B-058A-98D4-0AB6F514E822}"/>
-              </a:ext>
-            </a:extLst>
-          </p:cNvPr>
-          <p:cNvSpPr>
-            <a:spLocks noChangeAspect="1"/>
-          </p:cNvSpPr>
+          <p:cNvPr id="43" name="TextBox 42">
+            <a:extLst>
+              <a:ext uri="{FF2B5EF4-FFF2-40B4-BE49-F238E27FC236}">
+                <a16:creationId xmlns:a16="http://schemas.microsoft.com/office/drawing/2014/main" id="{8523C7FC-F141-32F8-7F24-EF9CB679834F}"/>
+              </a:ext>
+            </a:extLst>
+          </p:cNvPr>
+          <p:cNvSpPr txBox="1"/>
           <p:nvPr/>
         </p:nvSpPr>
         <p:spPr>
           <a:xfrm>
-            <a:off x="6779281" y="1596322"/>
+            <a:off x="-32138" y="2192024"/>
+            <a:ext cx="845103" cy="369332"/>
+          </a:xfrm>
+          <a:prstGeom prst="rect">
+            <a:avLst/>
+          </a:prstGeom>
+          <a:noFill/>
+        </p:spPr>
+        <p:txBody>
+          <a:bodyPr wrap="none" rtlCol="0">
+            <a:spAutoFit/>
+          </a:bodyPr>
+          <a:lstStyle/>
+          <a:p>
+            <a:r>
+              <a:rPr lang="en-US" b="1" dirty="0">
+                <a:solidFill>
+                  <a:schemeClr val="accent6">
+                    <a:lumMod val="75000"/>
+                  </a:schemeClr>
+                </a:solidFill>
+                <a:latin typeface="Chalkboard" panose="03050602040202020205" pitchFamily="66" charset="77"/>
+              </a:rPr>
+              <a:t>CS109</a:t>
+            </a:r>
+          </a:p>
+        </p:txBody>
+      </p:sp>
+      <p:sp>
+        <p:nvSpPr>
+          <p:cNvPr id="44" name="TextBox 43">
+            <a:extLst>
+              <a:ext uri="{FF2B5EF4-FFF2-40B4-BE49-F238E27FC236}">
+                <a16:creationId xmlns:a16="http://schemas.microsoft.com/office/drawing/2014/main" id="{1FC1E8DE-F8F4-F15D-E022-B2C3AF6CD3C1}"/>
+              </a:ext>
+            </a:extLst>
+          </p:cNvPr>
+          <p:cNvSpPr txBox="1"/>
+          <p:nvPr/>
+        </p:nvSpPr>
+        <p:spPr>
+          <a:xfrm>
+            <a:off x="10549591" y="1536524"/>
+            <a:ext cx="998991" cy="369332"/>
+          </a:xfrm>
+          <a:prstGeom prst="rect">
+            <a:avLst/>
+          </a:prstGeom>
+          <a:noFill/>
+        </p:spPr>
+        <p:txBody>
+          <a:bodyPr wrap="none" rtlCol="0">
+            <a:spAutoFit/>
+          </a:bodyPr>
+          <a:lstStyle/>
+          <a:p>
+            <a:r>
+              <a:rPr lang="en-US" b="1" dirty="0">
+                <a:solidFill>
+                  <a:schemeClr val="accent6">
+                    <a:lumMod val="75000"/>
+                  </a:schemeClr>
+                </a:solidFill>
+                <a:latin typeface="Chalkboard" panose="03050602040202020205" pitchFamily="66" charset="77"/>
+              </a:rPr>
+              <a:t>CS109A</a:t>
+            </a:r>
+          </a:p>
+        </p:txBody>
+      </p:sp>
+      <p:sp>
+        <p:nvSpPr>
+          <p:cNvPr id="45" name="TextBox 44">
+            <a:extLst>
+              <a:ext uri="{FF2B5EF4-FFF2-40B4-BE49-F238E27FC236}">
+                <a16:creationId xmlns:a16="http://schemas.microsoft.com/office/drawing/2014/main" id="{B46841C9-BF4F-7A85-81E1-51AD30BE93C6}"/>
+              </a:ext>
+            </a:extLst>
+          </p:cNvPr>
+          <p:cNvSpPr txBox="1"/>
+          <p:nvPr/>
+        </p:nvSpPr>
+        <p:spPr>
+          <a:xfrm>
+            <a:off x="10558407" y="2889206"/>
+            <a:ext cx="981359" cy="369332"/>
+          </a:xfrm>
+          <a:prstGeom prst="rect">
+            <a:avLst/>
+          </a:prstGeom>
+          <a:noFill/>
+        </p:spPr>
+        <p:txBody>
+          <a:bodyPr wrap="none" rtlCol="0">
+            <a:spAutoFit/>
+          </a:bodyPr>
+          <a:lstStyle/>
+          <a:p>
+            <a:r>
+              <a:rPr lang="en-US" b="1" dirty="0">
+                <a:solidFill>
+                  <a:schemeClr val="accent6">
+                    <a:lumMod val="75000"/>
+                  </a:schemeClr>
+                </a:solidFill>
+                <a:latin typeface="Chalkboard" panose="03050602040202020205" pitchFamily="66" charset="77"/>
+              </a:rPr>
+              <a:t>CS109B</a:t>
+            </a:r>
+          </a:p>
+        </p:txBody>
+      </p:sp>
+      <p:sp>
+        <p:nvSpPr>
+          <p:cNvPr id="46" name="TextBox 45">
+            <a:extLst>
+              <a:ext uri="{FF2B5EF4-FFF2-40B4-BE49-F238E27FC236}">
+                <a16:creationId xmlns:a16="http://schemas.microsoft.com/office/drawing/2014/main" id="{296C0212-24E2-DB8F-C98F-40126493DD0C}"/>
+              </a:ext>
+            </a:extLst>
+          </p:cNvPr>
+          <p:cNvSpPr txBox="1"/>
+          <p:nvPr/>
+        </p:nvSpPr>
+        <p:spPr>
+          <a:xfrm>
+            <a:off x="9273401" y="1015102"/>
+            <a:ext cx="710451" cy="369332"/>
+          </a:xfrm>
+          <a:prstGeom prst="rect">
+            <a:avLst/>
+          </a:prstGeom>
+          <a:noFill/>
+        </p:spPr>
+        <p:txBody>
+          <a:bodyPr wrap="none" rtlCol="0">
+            <a:spAutoFit/>
+          </a:bodyPr>
+          <a:lstStyle/>
+          <a:p>
+            <a:r>
+              <a:rPr lang="en-US" dirty="0">
+                <a:latin typeface="Chalkboard" panose="03050602040202020205" pitchFamily="66" charset="77"/>
+              </a:rPr>
+              <a:t>2022</a:t>
+            </a:r>
+          </a:p>
+        </p:txBody>
+      </p:sp>
+      <p:sp>
+        <p:nvSpPr>
+          <p:cNvPr id="48" name="Oval 47">
+            <a:extLst>
+              <a:ext uri="{FF2B5EF4-FFF2-40B4-BE49-F238E27FC236}">
+                <a16:creationId xmlns:a16="http://schemas.microsoft.com/office/drawing/2014/main" id="{89E9FAB6-D33B-058A-98D4-0AB6F514E822}"/>
+              </a:ext>
+            </a:extLst>
+          </p:cNvPr>
+          <p:cNvSpPr>
+            <a:spLocks noChangeAspect="1"/>
+          </p:cNvSpPr>
+          <p:nvPr/>
+        </p:nvSpPr>
+        <p:spPr>
+          <a:xfrm>
+            <a:off x="9525181" y="1605847"/>
             <a:ext cx="206893" cy="205856"/>
           </a:xfrm>
           <a:prstGeom prst="ellipse">
             <a:avLst/>
           </a:prstGeom>
           <a:solidFill>
-            <a:schemeClr val="accent6"/>
+            <a:schemeClr val="accent6">
+              <a:lumMod val="40000"/>
+              <a:lumOff val="60000"/>
+            </a:schemeClr>
           </a:solidFill>
           <a:ln>
             <a:noFill/>
@@ -5925,7 +6552,7 @@
       </p:sp>
       <p:sp>
         <p:nvSpPr>
-          <p:cNvPr id="41" name="Oval 40">
+          <p:cNvPr id="49" name="Oval 48">
             <a:extLst>
               <a:ext uri="{FF2B5EF4-FFF2-40B4-BE49-F238E27FC236}">
                 <a16:creationId xmlns:a16="http://schemas.microsoft.com/office/drawing/2014/main" id="{89E9FAB6-D33B-058A-98D4-0AB6F514E822}"/>
@@ -5939,599 +6566,7 @@
         </p:nvSpPr>
         <p:spPr>
           <a:xfrm>
-            <a:off x="7711838" y="1596322"/>
-            <a:ext cx="206893" cy="205856"/>
-          </a:xfrm>
-          <a:prstGeom prst="ellipse">
-            <a:avLst/>
-          </a:prstGeom>
-          <a:solidFill>
-            <a:schemeClr val="accent6"/>
-          </a:solidFill>
-          <a:ln>
-            <a:noFill/>
-          </a:ln>
-        </p:spPr>
-        <p:style>
-          <a:lnRef idx="2">
-            <a:schemeClr val="accent1">
-              <a:shade val="50000"/>
-            </a:schemeClr>
-          </a:lnRef>
-          <a:fillRef idx="1">
-            <a:schemeClr val="accent1"/>
-          </a:fillRef>
-          <a:effectRef idx="0">
-            <a:schemeClr val="accent1"/>
-          </a:effectRef>
-          <a:fontRef idx="minor">
-            <a:schemeClr val="lt1"/>
-          </a:fontRef>
-        </p:style>
-        <p:txBody>
-          <a:bodyPr rtlCol="0" anchor="ctr"/>
-          <a:lstStyle>
-            <a:defPPr>
-              <a:defRPr lang="en-US"/>
-            </a:defPPr>
-            <a:lvl1pPr marL="0" algn="l" defTabSz="914400" rtl="0" eaLnBrk="1" latinLnBrk="0" hangingPunct="1">
-              <a:defRPr sz="1800" kern="1200">
-                <a:solidFill>
-                  <a:schemeClr val="lt1"/>
-                </a:solidFill>
-                <a:latin typeface="+mn-lt"/>
-                <a:ea typeface="+mn-ea"/>
-                <a:cs typeface="+mn-cs"/>
-              </a:defRPr>
-            </a:lvl1pPr>
-            <a:lvl2pPr marL="457200" algn="l" defTabSz="914400" rtl="0" eaLnBrk="1" latinLnBrk="0" hangingPunct="1">
-              <a:defRPr sz="1800" kern="1200">
-                <a:solidFill>
-                  <a:schemeClr val="lt1"/>
-                </a:solidFill>
-                <a:latin typeface="+mn-lt"/>
-                <a:ea typeface="+mn-ea"/>
-                <a:cs typeface="+mn-cs"/>
-              </a:defRPr>
-            </a:lvl2pPr>
-            <a:lvl3pPr marL="914400" algn="l" defTabSz="914400" rtl="0" eaLnBrk="1" latinLnBrk="0" hangingPunct="1">
-              <a:defRPr sz="1800" kern="1200">
-                <a:solidFill>
-                  <a:schemeClr val="lt1"/>
-                </a:solidFill>
-                <a:latin typeface="+mn-lt"/>
-                <a:ea typeface="+mn-ea"/>
-                <a:cs typeface="+mn-cs"/>
-              </a:defRPr>
-            </a:lvl3pPr>
-            <a:lvl4pPr marL="1371600" algn="l" defTabSz="914400" rtl="0" eaLnBrk="1" latinLnBrk="0" hangingPunct="1">
-              <a:defRPr sz="1800" kern="1200">
-                <a:solidFill>
-                  <a:schemeClr val="lt1"/>
-                </a:solidFill>
-                <a:latin typeface="+mn-lt"/>
-                <a:ea typeface="+mn-ea"/>
-                <a:cs typeface="+mn-cs"/>
-              </a:defRPr>
-            </a:lvl4pPr>
-            <a:lvl5pPr marL="1828800" algn="l" defTabSz="914400" rtl="0" eaLnBrk="1" latinLnBrk="0" hangingPunct="1">
-              <a:defRPr sz="1800" kern="1200">
-                <a:solidFill>
-                  <a:schemeClr val="lt1"/>
-                </a:solidFill>
-                <a:latin typeface="+mn-lt"/>
-                <a:ea typeface="+mn-ea"/>
-                <a:cs typeface="+mn-cs"/>
-              </a:defRPr>
-            </a:lvl5pPr>
-            <a:lvl6pPr marL="2286000" algn="l" defTabSz="914400" rtl="0" eaLnBrk="1" latinLnBrk="0" hangingPunct="1">
-              <a:defRPr sz="1800" kern="1200">
-                <a:solidFill>
-                  <a:schemeClr val="lt1"/>
-                </a:solidFill>
-                <a:latin typeface="+mn-lt"/>
-                <a:ea typeface="+mn-ea"/>
-                <a:cs typeface="+mn-cs"/>
-              </a:defRPr>
-            </a:lvl6pPr>
-            <a:lvl7pPr marL="2743200" algn="l" defTabSz="914400" rtl="0" eaLnBrk="1" latinLnBrk="0" hangingPunct="1">
-              <a:defRPr sz="1800" kern="1200">
-                <a:solidFill>
-                  <a:schemeClr val="lt1"/>
-                </a:solidFill>
-                <a:latin typeface="+mn-lt"/>
-                <a:ea typeface="+mn-ea"/>
-                <a:cs typeface="+mn-cs"/>
-              </a:defRPr>
-            </a:lvl7pPr>
-            <a:lvl8pPr marL="3200400" algn="l" defTabSz="914400" rtl="0" eaLnBrk="1" latinLnBrk="0" hangingPunct="1">
-              <a:defRPr sz="1800" kern="1200">
-                <a:solidFill>
-                  <a:schemeClr val="lt1"/>
-                </a:solidFill>
-                <a:latin typeface="+mn-lt"/>
-                <a:ea typeface="+mn-ea"/>
-                <a:cs typeface="+mn-cs"/>
-              </a:defRPr>
-            </a:lvl8pPr>
-            <a:lvl9pPr marL="3657600" algn="l" defTabSz="914400" rtl="0" eaLnBrk="1" latinLnBrk="0" hangingPunct="1">
-              <a:defRPr sz="1800" kern="1200">
-                <a:solidFill>
-                  <a:schemeClr val="lt1"/>
-                </a:solidFill>
-                <a:latin typeface="+mn-lt"/>
-                <a:ea typeface="+mn-ea"/>
-                <a:cs typeface="+mn-cs"/>
-              </a:defRPr>
-            </a:lvl9pPr>
-          </a:lstStyle>
-          <a:p>
-            <a:pPr algn="ctr"/>
-            <a:endParaRPr lang="en-US" dirty="0"/>
-          </a:p>
-        </p:txBody>
-      </p:sp>
-      <p:sp>
-        <p:nvSpPr>
-          <p:cNvPr id="42" name="Oval 41">
-            <a:extLst>
-              <a:ext uri="{FF2B5EF4-FFF2-40B4-BE49-F238E27FC236}">
-                <a16:creationId xmlns:a16="http://schemas.microsoft.com/office/drawing/2014/main" id="{89E9FAB6-D33B-058A-98D4-0AB6F514E822}"/>
-              </a:ext>
-            </a:extLst>
-          </p:cNvPr>
-          <p:cNvSpPr>
-            <a:spLocks noChangeAspect="1"/>
-          </p:cNvSpPr>
-          <p:nvPr/>
-        </p:nvSpPr>
-        <p:spPr>
-          <a:xfrm>
-            <a:off x="8676788" y="1596322"/>
-            <a:ext cx="206893" cy="205856"/>
-          </a:xfrm>
-          <a:prstGeom prst="ellipse">
-            <a:avLst/>
-          </a:prstGeom>
-          <a:solidFill>
-            <a:schemeClr val="accent6"/>
-          </a:solidFill>
-          <a:ln>
-            <a:noFill/>
-          </a:ln>
-        </p:spPr>
-        <p:style>
-          <a:lnRef idx="2">
-            <a:schemeClr val="accent1">
-              <a:shade val="50000"/>
-            </a:schemeClr>
-          </a:lnRef>
-          <a:fillRef idx="1">
-            <a:schemeClr val="accent1"/>
-          </a:fillRef>
-          <a:effectRef idx="0">
-            <a:schemeClr val="accent1"/>
-          </a:effectRef>
-          <a:fontRef idx="minor">
-            <a:schemeClr val="lt1"/>
-          </a:fontRef>
-        </p:style>
-        <p:txBody>
-          <a:bodyPr rtlCol="0" anchor="ctr"/>
-          <a:lstStyle>
-            <a:defPPr>
-              <a:defRPr lang="en-US"/>
-            </a:defPPr>
-            <a:lvl1pPr marL="0" algn="l" defTabSz="914400" rtl="0" eaLnBrk="1" latinLnBrk="0" hangingPunct="1">
-              <a:defRPr sz="1800" kern="1200">
-                <a:solidFill>
-                  <a:schemeClr val="lt1"/>
-                </a:solidFill>
-                <a:latin typeface="+mn-lt"/>
-                <a:ea typeface="+mn-ea"/>
-                <a:cs typeface="+mn-cs"/>
-              </a:defRPr>
-            </a:lvl1pPr>
-            <a:lvl2pPr marL="457200" algn="l" defTabSz="914400" rtl="0" eaLnBrk="1" latinLnBrk="0" hangingPunct="1">
-              <a:defRPr sz="1800" kern="1200">
-                <a:solidFill>
-                  <a:schemeClr val="lt1"/>
-                </a:solidFill>
-                <a:latin typeface="+mn-lt"/>
-                <a:ea typeface="+mn-ea"/>
-                <a:cs typeface="+mn-cs"/>
-              </a:defRPr>
-            </a:lvl2pPr>
-            <a:lvl3pPr marL="914400" algn="l" defTabSz="914400" rtl="0" eaLnBrk="1" latinLnBrk="0" hangingPunct="1">
-              <a:defRPr sz="1800" kern="1200">
-                <a:solidFill>
-                  <a:schemeClr val="lt1"/>
-                </a:solidFill>
-                <a:latin typeface="+mn-lt"/>
-                <a:ea typeface="+mn-ea"/>
-                <a:cs typeface="+mn-cs"/>
-              </a:defRPr>
-            </a:lvl3pPr>
-            <a:lvl4pPr marL="1371600" algn="l" defTabSz="914400" rtl="0" eaLnBrk="1" latinLnBrk="0" hangingPunct="1">
-              <a:defRPr sz="1800" kern="1200">
-                <a:solidFill>
-                  <a:schemeClr val="lt1"/>
-                </a:solidFill>
-                <a:latin typeface="+mn-lt"/>
-                <a:ea typeface="+mn-ea"/>
-                <a:cs typeface="+mn-cs"/>
-              </a:defRPr>
-            </a:lvl4pPr>
-            <a:lvl5pPr marL="1828800" algn="l" defTabSz="914400" rtl="0" eaLnBrk="1" latinLnBrk="0" hangingPunct="1">
-              <a:defRPr sz="1800" kern="1200">
-                <a:solidFill>
-                  <a:schemeClr val="lt1"/>
-                </a:solidFill>
-                <a:latin typeface="+mn-lt"/>
-                <a:ea typeface="+mn-ea"/>
-                <a:cs typeface="+mn-cs"/>
-              </a:defRPr>
-            </a:lvl5pPr>
-            <a:lvl6pPr marL="2286000" algn="l" defTabSz="914400" rtl="0" eaLnBrk="1" latinLnBrk="0" hangingPunct="1">
-              <a:defRPr sz="1800" kern="1200">
-                <a:solidFill>
-                  <a:schemeClr val="lt1"/>
-                </a:solidFill>
-                <a:latin typeface="+mn-lt"/>
-                <a:ea typeface="+mn-ea"/>
-                <a:cs typeface="+mn-cs"/>
-              </a:defRPr>
-            </a:lvl6pPr>
-            <a:lvl7pPr marL="2743200" algn="l" defTabSz="914400" rtl="0" eaLnBrk="1" latinLnBrk="0" hangingPunct="1">
-              <a:defRPr sz="1800" kern="1200">
-                <a:solidFill>
-                  <a:schemeClr val="lt1"/>
-                </a:solidFill>
-                <a:latin typeface="+mn-lt"/>
-                <a:ea typeface="+mn-ea"/>
-                <a:cs typeface="+mn-cs"/>
-              </a:defRPr>
-            </a:lvl7pPr>
-            <a:lvl8pPr marL="3200400" algn="l" defTabSz="914400" rtl="0" eaLnBrk="1" latinLnBrk="0" hangingPunct="1">
-              <a:defRPr sz="1800" kern="1200">
-                <a:solidFill>
-                  <a:schemeClr val="lt1"/>
-                </a:solidFill>
-                <a:latin typeface="+mn-lt"/>
-                <a:ea typeface="+mn-ea"/>
-                <a:cs typeface="+mn-cs"/>
-              </a:defRPr>
-            </a:lvl8pPr>
-            <a:lvl9pPr marL="3657600" algn="l" defTabSz="914400" rtl="0" eaLnBrk="1" latinLnBrk="0" hangingPunct="1">
-              <a:defRPr sz="1800" kern="1200">
-                <a:solidFill>
-                  <a:schemeClr val="lt1"/>
-                </a:solidFill>
-                <a:latin typeface="+mn-lt"/>
-                <a:ea typeface="+mn-ea"/>
-                <a:cs typeface="+mn-cs"/>
-              </a:defRPr>
-            </a:lvl9pPr>
-          </a:lstStyle>
-          <a:p>
-            <a:pPr algn="ctr"/>
-            <a:endParaRPr lang="en-US" dirty="0"/>
-          </a:p>
-        </p:txBody>
-      </p:sp>
-      <p:sp>
-        <p:nvSpPr>
-          <p:cNvPr id="43" name="TextBox 42">
-            <a:extLst>
-              <a:ext uri="{FF2B5EF4-FFF2-40B4-BE49-F238E27FC236}">
-                <a16:creationId xmlns:a16="http://schemas.microsoft.com/office/drawing/2014/main" id="{8523C7FC-F141-32F8-7F24-EF9CB679834F}"/>
-              </a:ext>
-            </a:extLst>
-          </p:cNvPr>
-          <p:cNvSpPr txBox="1"/>
-          <p:nvPr/>
-        </p:nvSpPr>
-        <p:spPr>
-          <a:xfrm>
-            <a:off x="1992581" y="2698687"/>
-            <a:ext cx="803425" cy="369332"/>
-          </a:xfrm>
-          <a:prstGeom prst="rect">
-            <a:avLst/>
-          </a:prstGeom>
-          <a:noFill/>
-        </p:spPr>
-        <p:txBody>
-          <a:bodyPr wrap="none" rtlCol="0">
-            <a:spAutoFit/>
-          </a:bodyPr>
-          <a:lstStyle/>
-          <a:p>
-            <a:r>
-              <a:rPr lang="en-US" dirty="0">
-                <a:latin typeface="Chalkboard" panose="03050602040202020205" pitchFamily="66" charset="77"/>
-              </a:rPr>
-              <a:t>CS109</a:t>
-            </a:r>
-          </a:p>
-        </p:txBody>
-      </p:sp>
-      <p:sp>
-        <p:nvSpPr>
-          <p:cNvPr id="44" name="TextBox 43">
-            <a:extLst>
-              <a:ext uri="{FF2B5EF4-FFF2-40B4-BE49-F238E27FC236}">
-                <a16:creationId xmlns:a16="http://schemas.microsoft.com/office/drawing/2014/main" id="{1FC1E8DE-F8F4-F15D-E022-B2C3AF6CD3C1}"/>
-              </a:ext>
-            </a:extLst>
-          </p:cNvPr>
-          <p:cNvSpPr txBox="1"/>
-          <p:nvPr/>
-        </p:nvSpPr>
-        <p:spPr>
-          <a:xfrm>
-            <a:off x="6442338" y="1911867"/>
-            <a:ext cx="952505" cy="369332"/>
-          </a:xfrm>
-          <a:prstGeom prst="rect">
-            <a:avLst/>
-          </a:prstGeom>
-          <a:noFill/>
-        </p:spPr>
-        <p:txBody>
-          <a:bodyPr wrap="none" rtlCol="0">
-            <a:spAutoFit/>
-          </a:bodyPr>
-          <a:lstStyle/>
-          <a:p>
-            <a:r>
-              <a:rPr lang="en-US" dirty="0">
-                <a:latin typeface="Chalkboard" panose="03050602040202020205" pitchFamily="66" charset="77"/>
-              </a:rPr>
-              <a:t>CS109A</a:t>
-            </a:r>
-          </a:p>
-        </p:txBody>
-      </p:sp>
-      <p:sp>
-        <p:nvSpPr>
-          <p:cNvPr id="45" name="TextBox 44">
-            <a:extLst>
-              <a:ext uri="{FF2B5EF4-FFF2-40B4-BE49-F238E27FC236}">
-                <a16:creationId xmlns:a16="http://schemas.microsoft.com/office/drawing/2014/main" id="{B46841C9-BF4F-7A85-81E1-51AD30BE93C6}"/>
-              </a:ext>
-            </a:extLst>
-          </p:cNvPr>
-          <p:cNvSpPr txBox="1"/>
-          <p:nvPr/>
-        </p:nvSpPr>
-        <p:spPr>
-          <a:xfrm>
-            <a:off x="6471597" y="3332748"/>
-            <a:ext cx="934871" cy="369332"/>
-          </a:xfrm>
-          <a:prstGeom prst="rect">
-            <a:avLst/>
-          </a:prstGeom>
-          <a:noFill/>
-        </p:spPr>
-        <p:txBody>
-          <a:bodyPr wrap="none" rtlCol="0">
-            <a:spAutoFit/>
-          </a:bodyPr>
-          <a:lstStyle/>
-          <a:p>
-            <a:r>
-              <a:rPr lang="en-US" dirty="0">
-                <a:latin typeface="Chalkboard" panose="03050602040202020205" pitchFamily="66" charset="77"/>
-              </a:rPr>
-              <a:t>CS109B</a:t>
-            </a:r>
-          </a:p>
-        </p:txBody>
-      </p:sp>
-      <p:sp>
-        <p:nvSpPr>
-          <p:cNvPr id="46" name="TextBox 45">
-            <a:extLst>
-              <a:ext uri="{FF2B5EF4-FFF2-40B4-BE49-F238E27FC236}">
-                <a16:creationId xmlns:a16="http://schemas.microsoft.com/office/drawing/2014/main" id="{296C0212-24E2-DB8F-C98F-40126493DD0C}"/>
-              </a:ext>
-            </a:extLst>
-          </p:cNvPr>
-          <p:cNvSpPr txBox="1"/>
-          <p:nvPr/>
-        </p:nvSpPr>
-        <p:spPr>
-          <a:xfrm>
-            <a:off x="9415678" y="1009272"/>
-            <a:ext cx="710451" cy="369332"/>
-          </a:xfrm>
-          <a:prstGeom prst="rect">
-            <a:avLst/>
-          </a:prstGeom>
-          <a:noFill/>
-        </p:spPr>
-        <p:txBody>
-          <a:bodyPr wrap="none" rtlCol="0">
-            <a:spAutoFit/>
-          </a:bodyPr>
-          <a:lstStyle/>
-          <a:p>
-            <a:r>
-              <a:rPr lang="en-US" dirty="0">
-                <a:latin typeface="Chalkboard" panose="03050602040202020205" pitchFamily="66" charset="77"/>
-              </a:rPr>
-              <a:t>2022</a:t>
-            </a:r>
-          </a:p>
-        </p:txBody>
-      </p:sp>
-      <p:sp>
-        <p:nvSpPr>
-          <p:cNvPr id="48" name="Oval 47">
-            <a:extLst>
-              <a:ext uri="{FF2B5EF4-FFF2-40B4-BE49-F238E27FC236}">
-                <a16:creationId xmlns:a16="http://schemas.microsoft.com/office/drawing/2014/main" id="{89E9FAB6-D33B-058A-98D4-0AB6F514E822}"/>
-              </a:ext>
-            </a:extLst>
-          </p:cNvPr>
-          <p:cNvSpPr>
-            <a:spLocks noChangeAspect="1"/>
-          </p:cNvSpPr>
-          <p:nvPr/>
-        </p:nvSpPr>
-        <p:spPr>
-          <a:xfrm>
-            <a:off x="9641738" y="1592311"/>
-            <a:ext cx="206893" cy="205856"/>
-          </a:xfrm>
-          <a:prstGeom prst="ellipse">
-            <a:avLst/>
-          </a:prstGeom>
-          <a:solidFill>
-            <a:schemeClr val="accent6"/>
-          </a:solidFill>
-          <a:ln>
-            <a:noFill/>
-          </a:ln>
-        </p:spPr>
-        <p:style>
-          <a:lnRef idx="2">
-            <a:schemeClr val="accent1">
-              <a:shade val="50000"/>
-            </a:schemeClr>
-          </a:lnRef>
-          <a:fillRef idx="1">
-            <a:schemeClr val="accent1"/>
-          </a:fillRef>
-          <a:effectRef idx="0">
-            <a:schemeClr val="accent1"/>
-          </a:effectRef>
-          <a:fontRef idx="minor">
-            <a:schemeClr val="lt1"/>
-          </a:fontRef>
-        </p:style>
-        <p:txBody>
-          <a:bodyPr rtlCol="0" anchor="ctr"/>
-          <a:lstStyle>
-            <a:defPPr>
-              <a:defRPr lang="en-US"/>
-            </a:defPPr>
-            <a:lvl1pPr marL="0" algn="l" defTabSz="914400" rtl="0" eaLnBrk="1" latinLnBrk="0" hangingPunct="1">
-              <a:defRPr sz="1800" kern="1200">
-                <a:solidFill>
-                  <a:schemeClr val="lt1"/>
-                </a:solidFill>
-                <a:latin typeface="+mn-lt"/>
-                <a:ea typeface="+mn-ea"/>
-                <a:cs typeface="+mn-cs"/>
-              </a:defRPr>
-            </a:lvl1pPr>
-            <a:lvl2pPr marL="457200" algn="l" defTabSz="914400" rtl="0" eaLnBrk="1" latinLnBrk="0" hangingPunct="1">
-              <a:defRPr sz="1800" kern="1200">
-                <a:solidFill>
-                  <a:schemeClr val="lt1"/>
-                </a:solidFill>
-                <a:latin typeface="+mn-lt"/>
-                <a:ea typeface="+mn-ea"/>
-                <a:cs typeface="+mn-cs"/>
-              </a:defRPr>
-            </a:lvl2pPr>
-            <a:lvl3pPr marL="914400" algn="l" defTabSz="914400" rtl="0" eaLnBrk="1" latinLnBrk="0" hangingPunct="1">
-              <a:defRPr sz="1800" kern="1200">
-                <a:solidFill>
-                  <a:schemeClr val="lt1"/>
-                </a:solidFill>
-                <a:latin typeface="+mn-lt"/>
-                <a:ea typeface="+mn-ea"/>
-                <a:cs typeface="+mn-cs"/>
-              </a:defRPr>
-            </a:lvl3pPr>
-            <a:lvl4pPr marL="1371600" algn="l" defTabSz="914400" rtl="0" eaLnBrk="1" latinLnBrk="0" hangingPunct="1">
-              <a:defRPr sz="1800" kern="1200">
-                <a:solidFill>
-                  <a:schemeClr val="lt1"/>
-                </a:solidFill>
-                <a:latin typeface="+mn-lt"/>
-                <a:ea typeface="+mn-ea"/>
-                <a:cs typeface="+mn-cs"/>
-              </a:defRPr>
-            </a:lvl4pPr>
-            <a:lvl5pPr marL="1828800" algn="l" defTabSz="914400" rtl="0" eaLnBrk="1" latinLnBrk="0" hangingPunct="1">
-              <a:defRPr sz="1800" kern="1200">
-                <a:solidFill>
-                  <a:schemeClr val="lt1"/>
-                </a:solidFill>
-                <a:latin typeface="+mn-lt"/>
-                <a:ea typeface="+mn-ea"/>
-                <a:cs typeface="+mn-cs"/>
-              </a:defRPr>
-            </a:lvl5pPr>
-            <a:lvl6pPr marL="2286000" algn="l" defTabSz="914400" rtl="0" eaLnBrk="1" latinLnBrk="0" hangingPunct="1">
-              <a:defRPr sz="1800" kern="1200">
-                <a:solidFill>
-                  <a:schemeClr val="lt1"/>
-                </a:solidFill>
-                <a:latin typeface="+mn-lt"/>
-                <a:ea typeface="+mn-ea"/>
-                <a:cs typeface="+mn-cs"/>
-              </a:defRPr>
-            </a:lvl6pPr>
-            <a:lvl7pPr marL="2743200" algn="l" defTabSz="914400" rtl="0" eaLnBrk="1" latinLnBrk="0" hangingPunct="1">
-              <a:defRPr sz="1800" kern="1200">
-                <a:solidFill>
-                  <a:schemeClr val="lt1"/>
-                </a:solidFill>
-                <a:latin typeface="+mn-lt"/>
-                <a:ea typeface="+mn-ea"/>
-                <a:cs typeface="+mn-cs"/>
-              </a:defRPr>
-            </a:lvl7pPr>
-            <a:lvl8pPr marL="3200400" algn="l" defTabSz="914400" rtl="0" eaLnBrk="1" latinLnBrk="0" hangingPunct="1">
-              <a:defRPr sz="1800" kern="1200">
-                <a:solidFill>
-                  <a:schemeClr val="lt1"/>
-                </a:solidFill>
-                <a:latin typeface="+mn-lt"/>
-                <a:ea typeface="+mn-ea"/>
-                <a:cs typeface="+mn-cs"/>
-              </a:defRPr>
-            </a:lvl8pPr>
-            <a:lvl9pPr marL="3657600" algn="l" defTabSz="914400" rtl="0" eaLnBrk="1" latinLnBrk="0" hangingPunct="1">
-              <a:defRPr sz="1800" kern="1200">
-                <a:solidFill>
-                  <a:schemeClr val="lt1"/>
-                </a:solidFill>
-                <a:latin typeface="+mn-lt"/>
-                <a:ea typeface="+mn-ea"/>
-                <a:cs typeface="+mn-cs"/>
-              </a:defRPr>
-            </a:lvl9pPr>
-          </a:lstStyle>
-          <a:p>
-            <a:pPr algn="ctr"/>
-            <a:endParaRPr lang="en-US" dirty="0"/>
-          </a:p>
-        </p:txBody>
-      </p:sp>
-      <p:sp>
-        <p:nvSpPr>
-          <p:cNvPr id="49" name="Oval 48">
-            <a:extLst>
-              <a:ext uri="{FF2B5EF4-FFF2-40B4-BE49-F238E27FC236}">
-                <a16:creationId xmlns:a16="http://schemas.microsoft.com/office/drawing/2014/main" id="{89E9FAB6-D33B-058A-98D4-0AB6F514E822}"/>
-              </a:ext>
-            </a:extLst>
-          </p:cNvPr>
-          <p:cNvSpPr>
-            <a:spLocks noChangeAspect="1"/>
-          </p:cNvSpPr>
-          <p:nvPr/>
-        </p:nvSpPr>
-        <p:spPr>
-          <a:xfrm>
-            <a:off x="9641738" y="2965076"/>
+            <a:off x="9525181" y="2970944"/>
             <a:ext cx="206893" cy="205856"/>
           </a:xfrm>
           <a:prstGeom prst="ellipse">
@@ -6849,6 +6884,1401 @@
                 <a:latin typeface="Chalkboard" panose="03050602040202020205" pitchFamily="66" charset="77"/>
               </a:rPr>
               <a:t> M3</a:t>
+            </a:r>
+          </a:p>
+        </p:txBody>
+      </p:sp>
+      <p:sp>
+        <p:nvSpPr>
+          <p:cNvPr id="11" name="Oval 10">
+            <a:extLst>
+              <a:ext uri="{FF2B5EF4-FFF2-40B4-BE49-F238E27FC236}">
+                <a16:creationId xmlns:a16="http://schemas.microsoft.com/office/drawing/2014/main" id="{89E9FAB6-D33B-058A-98D4-0AB6F514E822}"/>
+              </a:ext>
+            </a:extLst>
+          </p:cNvPr>
+          <p:cNvSpPr>
+            <a:spLocks noChangeAspect="1"/>
+          </p:cNvSpPr>
+          <p:nvPr/>
+        </p:nvSpPr>
+        <p:spPr>
+          <a:xfrm>
+            <a:off x="601435" y="5017457"/>
+            <a:ext cx="206893" cy="205856"/>
+          </a:xfrm>
+          <a:prstGeom prst="ellipse">
+            <a:avLst/>
+          </a:prstGeom>
+          <a:solidFill>
+            <a:schemeClr val="accent4">
+              <a:lumMod val="60000"/>
+              <a:lumOff val="40000"/>
+              <a:alpha val="69013"/>
+            </a:schemeClr>
+          </a:solidFill>
+          <a:ln>
+            <a:noFill/>
+          </a:ln>
+        </p:spPr>
+        <p:style>
+          <a:lnRef idx="2">
+            <a:schemeClr val="accent1">
+              <a:shade val="50000"/>
+            </a:schemeClr>
+          </a:lnRef>
+          <a:fillRef idx="1">
+            <a:schemeClr val="accent1"/>
+          </a:fillRef>
+          <a:effectRef idx="0">
+            <a:schemeClr val="accent1"/>
+          </a:effectRef>
+          <a:fontRef idx="minor">
+            <a:schemeClr val="lt1"/>
+          </a:fontRef>
+        </p:style>
+        <p:txBody>
+          <a:bodyPr rtlCol="0" anchor="ctr"/>
+          <a:lstStyle>
+            <a:defPPr>
+              <a:defRPr lang="en-US"/>
+            </a:defPPr>
+            <a:lvl1pPr marL="0" algn="l" defTabSz="914400" rtl="0" eaLnBrk="1" latinLnBrk="0" hangingPunct="1">
+              <a:defRPr sz="1800" kern="1200">
+                <a:solidFill>
+                  <a:schemeClr val="lt1"/>
+                </a:solidFill>
+                <a:latin typeface="+mn-lt"/>
+                <a:ea typeface="+mn-ea"/>
+                <a:cs typeface="+mn-cs"/>
+              </a:defRPr>
+            </a:lvl1pPr>
+            <a:lvl2pPr marL="457200" algn="l" defTabSz="914400" rtl="0" eaLnBrk="1" latinLnBrk="0" hangingPunct="1">
+              <a:defRPr sz="1800" kern="1200">
+                <a:solidFill>
+                  <a:schemeClr val="lt1"/>
+                </a:solidFill>
+                <a:latin typeface="+mn-lt"/>
+                <a:ea typeface="+mn-ea"/>
+                <a:cs typeface="+mn-cs"/>
+              </a:defRPr>
+            </a:lvl2pPr>
+            <a:lvl3pPr marL="914400" algn="l" defTabSz="914400" rtl="0" eaLnBrk="1" latinLnBrk="0" hangingPunct="1">
+              <a:defRPr sz="1800" kern="1200">
+                <a:solidFill>
+                  <a:schemeClr val="lt1"/>
+                </a:solidFill>
+                <a:latin typeface="+mn-lt"/>
+                <a:ea typeface="+mn-ea"/>
+                <a:cs typeface="+mn-cs"/>
+              </a:defRPr>
+            </a:lvl3pPr>
+            <a:lvl4pPr marL="1371600" algn="l" defTabSz="914400" rtl="0" eaLnBrk="1" latinLnBrk="0" hangingPunct="1">
+              <a:defRPr sz="1800" kern="1200">
+                <a:solidFill>
+                  <a:schemeClr val="lt1"/>
+                </a:solidFill>
+                <a:latin typeface="+mn-lt"/>
+                <a:ea typeface="+mn-ea"/>
+                <a:cs typeface="+mn-cs"/>
+              </a:defRPr>
+            </a:lvl4pPr>
+            <a:lvl5pPr marL="1828800" algn="l" defTabSz="914400" rtl="0" eaLnBrk="1" latinLnBrk="0" hangingPunct="1">
+              <a:defRPr sz="1800" kern="1200">
+                <a:solidFill>
+                  <a:schemeClr val="lt1"/>
+                </a:solidFill>
+                <a:latin typeface="+mn-lt"/>
+                <a:ea typeface="+mn-ea"/>
+                <a:cs typeface="+mn-cs"/>
+              </a:defRPr>
+            </a:lvl5pPr>
+            <a:lvl6pPr marL="2286000" algn="l" defTabSz="914400" rtl="0" eaLnBrk="1" latinLnBrk="0" hangingPunct="1">
+              <a:defRPr sz="1800" kern="1200">
+                <a:solidFill>
+                  <a:schemeClr val="lt1"/>
+                </a:solidFill>
+                <a:latin typeface="+mn-lt"/>
+                <a:ea typeface="+mn-ea"/>
+                <a:cs typeface="+mn-cs"/>
+              </a:defRPr>
+            </a:lvl6pPr>
+            <a:lvl7pPr marL="2743200" algn="l" defTabSz="914400" rtl="0" eaLnBrk="1" latinLnBrk="0" hangingPunct="1">
+              <a:defRPr sz="1800" kern="1200">
+                <a:solidFill>
+                  <a:schemeClr val="lt1"/>
+                </a:solidFill>
+                <a:latin typeface="+mn-lt"/>
+                <a:ea typeface="+mn-ea"/>
+                <a:cs typeface="+mn-cs"/>
+              </a:defRPr>
+            </a:lvl7pPr>
+            <a:lvl8pPr marL="3200400" algn="l" defTabSz="914400" rtl="0" eaLnBrk="1" latinLnBrk="0" hangingPunct="1">
+              <a:defRPr sz="1800" kern="1200">
+                <a:solidFill>
+                  <a:schemeClr val="lt1"/>
+                </a:solidFill>
+                <a:latin typeface="+mn-lt"/>
+                <a:ea typeface="+mn-ea"/>
+                <a:cs typeface="+mn-cs"/>
+              </a:defRPr>
+            </a:lvl8pPr>
+            <a:lvl9pPr marL="3657600" algn="l" defTabSz="914400" rtl="0" eaLnBrk="1" latinLnBrk="0" hangingPunct="1">
+              <a:defRPr sz="1800" kern="1200">
+                <a:solidFill>
+                  <a:schemeClr val="lt1"/>
+                </a:solidFill>
+                <a:latin typeface="+mn-lt"/>
+                <a:ea typeface="+mn-ea"/>
+                <a:cs typeface="+mn-cs"/>
+              </a:defRPr>
+            </a:lvl9pPr>
+          </a:lstStyle>
+          <a:p>
+            <a:pPr algn="ctr"/>
+            <a:endParaRPr lang="en-US" dirty="0"/>
+          </a:p>
+        </p:txBody>
+      </p:sp>
+      <p:sp>
+        <p:nvSpPr>
+          <p:cNvPr id="12" name="TextBox 11">
+            <a:extLst>
+              <a:ext uri="{FF2B5EF4-FFF2-40B4-BE49-F238E27FC236}">
+                <a16:creationId xmlns:a16="http://schemas.microsoft.com/office/drawing/2014/main" id="{F8B904E5-08C8-F382-2AA2-7E492807CD58}"/>
+              </a:ext>
+            </a:extLst>
+          </p:cNvPr>
+          <p:cNvSpPr txBox="1"/>
+          <p:nvPr/>
+        </p:nvSpPr>
+        <p:spPr>
+          <a:xfrm>
+            <a:off x="996075" y="4951385"/>
+            <a:ext cx="660437" cy="369332"/>
+          </a:xfrm>
+          <a:prstGeom prst="rect">
+            <a:avLst/>
+          </a:prstGeom>
+          <a:noFill/>
+        </p:spPr>
+        <p:txBody>
+          <a:bodyPr wrap="none" rtlCol="0">
+            <a:spAutoFit/>
+          </a:bodyPr>
+          <a:lstStyle/>
+          <a:p>
+            <a:r>
+              <a:rPr lang="en-US" dirty="0" err="1">
+                <a:latin typeface="Chalkboard" panose="03050602040202020205" pitchFamily="66" charset="77"/>
+              </a:rPr>
+              <a:t>Rafa</a:t>
+            </a:r>
+            <a:endParaRPr lang="en-US" dirty="0">
+              <a:latin typeface="Chalkboard" panose="03050602040202020205" pitchFamily="66" charset="77"/>
+            </a:endParaRPr>
+          </a:p>
+        </p:txBody>
+      </p:sp>
+      <p:sp>
+        <p:nvSpPr>
+          <p:cNvPr id="13" name="Oval 12">
+            <a:extLst>
+              <a:ext uri="{FF2B5EF4-FFF2-40B4-BE49-F238E27FC236}">
+                <a16:creationId xmlns:a16="http://schemas.microsoft.com/office/drawing/2014/main" id="{89E9FAB6-D33B-058A-98D4-0AB6F514E822}"/>
+              </a:ext>
+            </a:extLst>
+          </p:cNvPr>
+          <p:cNvSpPr>
+            <a:spLocks noChangeAspect="1"/>
+          </p:cNvSpPr>
+          <p:nvPr/>
+        </p:nvSpPr>
+        <p:spPr>
+          <a:xfrm>
+            <a:off x="601434" y="4528175"/>
+            <a:ext cx="206893" cy="205856"/>
+          </a:xfrm>
+          <a:prstGeom prst="ellipse">
+            <a:avLst/>
+          </a:prstGeom>
+          <a:solidFill>
+            <a:schemeClr val="accent2">
+              <a:alpha val="69013"/>
+            </a:schemeClr>
+          </a:solidFill>
+          <a:ln>
+            <a:noFill/>
+          </a:ln>
+        </p:spPr>
+        <p:style>
+          <a:lnRef idx="2">
+            <a:schemeClr val="accent1">
+              <a:shade val="50000"/>
+            </a:schemeClr>
+          </a:lnRef>
+          <a:fillRef idx="1">
+            <a:schemeClr val="accent1"/>
+          </a:fillRef>
+          <a:effectRef idx="0">
+            <a:schemeClr val="accent1"/>
+          </a:effectRef>
+          <a:fontRef idx="minor">
+            <a:schemeClr val="lt1"/>
+          </a:fontRef>
+        </p:style>
+        <p:txBody>
+          <a:bodyPr rtlCol="0" anchor="ctr"/>
+          <a:lstStyle>
+            <a:defPPr>
+              <a:defRPr lang="en-US"/>
+            </a:defPPr>
+            <a:lvl1pPr marL="0" algn="l" defTabSz="914400" rtl="0" eaLnBrk="1" latinLnBrk="0" hangingPunct="1">
+              <a:defRPr sz="1800" kern="1200">
+                <a:solidFill>
+                  <a:schemeClr val="lt1"/>
+                </a:solidFill>
+                <a:latin typeface="+mn-lt"/>
+                <a:ea typeface="+mn-ea"/>
+                <a:cs typeface="+mn-cs"/>
+              </a:defRPr>
+            </a:lvl1pPr>
+            <a:lvl2pPr marL="457200" algn="l" defTabSz="914400" rtl="0" eaLnBrk="1" latinLnBrk="0" hangingPunct="1">
+              <a:defRPr sz="1800" kern="1200">
+                <a:solidFill>
+                  <a:schemeClr val="lt1"/>
+                </a:solidFill>
+                <a:latin typeface="+mn-lt"/>
+                <a:ea typeface="+mn-ea"/>
+                <a:cs typeface="+mn-cs"/>
+              </a:defRPr>
+            </a:lvl2pPr>
+            <a:lvl3pPr marL="914400" algn="l" defTabSz="914400" rtl="0" eaLnBrk="1" latinLnBrk="0" hangingPunct="1">
+              <a:defRPr sz="1800" kern="1200">
+                <a:solidFill>
+                  <a:schemeClr val="lt1"/>
+                </a:solidFill>
+                <a:latin typeface="+mn-lt"/>
+                <a:ea typeface="+mn-ea"/>
+                <a:cs typeface="+mn-cs"/>
+              </a:defRPr>
+            </a:lvl3pPr>
+            <a:lvl4pPr marL="1371600" algn="l" defTabSz="914400" rtl="0" eaLnBrk="1" latinLnBrk="0" hangingPunct="1">
+              <a:defRPr sz="1800" kern="1200">
+                <a:solidFill>
+                  <a:schemeClr val="lt1"/>
+                </a:solidFill>
+                <a:latin typeface="+mn-lt"/>
+                <a:ea typeface="+mn-ea"/>
+                <a:cs typeface="+mn-cs"/>
+              </a:defRPr>
+            </a:lvl4pPr>
+            <a:lvl5pPr marL="1828800" algn="l" defTabSz="914400" rtl="0" eaLnBrk="1" latinLnBrk="0" hangingPunct="1">
+              <a:defRPr sz="1800" kern="1200">
+                <a:solidFill>
+                  <a:schemeClr val="lt1"/>
+                </a:solidFill>
+                <a:latin typeface="+mn-lt"/>
+                <a:ea typeface="+mn-ea"/>
+                <a:cs typeface="+mn-cs"/>
+              </a:defRPr>
+            </a:lvl5pPr>
+            <a:lvl6pPr marL="2286000" algn="l" defTabSz="914400" rtl="0" eaLnBrk="1" latinLnBrk="0" hangingPunct="1">
+              <a:defRPr sz="1800" kern="1200">
+                <a:solidFill>
+                  <a:schemeClr val="lt1"/>
+                </a:solidFill>
+                <a:latin typeface="+mn-lt"/>
+                <a:ea typeface="+mn-ea"/>
+                <a:cs typeface="+mn-cs"/>
+              </a:defRPr>
+            </a:lvl6pPr>
+            <a:lvl7pPr marL="2743200" algn="l" defTabSz="914400" rtl="0" eaLnBrk="1" latinLnBrk="0" hangingPunct="1">
+              <a:defRPr sz="1800" kern="1200">
+                <a:solidFill>
+                  <a:schemeClr val="lt1"/>
+                </a:solidFill>
+                <a:latin typeface="+mn-lt"/>
+                <a:ea typeface="+mn-ea"/>
+                <a:cs typeface="+mn-cs"/>
+              </a:defRPr>
+            </a:lvl7pPr>
+            <a:lvl8pPr marL="3200400" algn="l" defTabSz="914400" rtl="0" eaLnBrk="1" latinLnBrk="0" hangingPunct="1">
+              <a:defRPr sz="1800" kern="1200">
+                <a:solidFill>
+                  <a:schemeClr val="lt1"/>
+                </a:solidFill>
+                <a:latin typeface="+mn-lt"/>
+                <a:ea typeface="+mn-ea"/>
+                <a:cs typeface="+mn-cs"/>
+              </a:defRPr>
+            </a:lvl8pPr>
+            <a:lvl9pPr marL="3657600" algn="l" defTabSz="914400" rtl="0" eaLnBrk="1" latinLnBrk="0" hangingPunct="1">
+              <a:defRPr sz="1800" kern="1200">
+                <a:solidFill>
+                  <a:schemeClr val="lt1"/>
+                </a:solidFill>
+                <a:latin typeface="+mn-lt"/>
+                <a:ea typeface="+mn-ea"/>
+                <a:cs typeface="+mn-cs"/>
+              </a:defRPr>
+            </a:lvl9pPr>
+          </a:lstStyle>
+          <a:p>
+            <a:pPr algn="ctr"/>
+            <a:endParaRPr lang="en-US" dirty="0"/>
+          </a:p>
+        </p:txBody>
+      </p:sp>
+      <p:sp>
+        <p:nvSpPr>
+          <p:cNvPr id="14" name="TextBox 13">
+            <a:extLst>
+              <a:ext uri="{FF2B5EF4-FFF2-40B4-BE49-F238E27FC236}">
+                <a16:creationId xmlns:a16="http://schemas.microsoft.com/office/drawing/2014/main" id="{B892E96A-FF6D-5EF0-167F-6673E7880E0F}"/>
+              </a:ext>
+            </a:extLst>
+          </p:cNvPr>
+          <p:cNvSpPr txBox="1"/>
+          <p:nvPr/>
+        </p:nvSpPr>
+        <p:spPr>
+          <a:xfrm>
+            <a:off x="996075" y="4457568"/>
+            <a:ext cx="1954381" cy="369332"/>
+          </a:xfrm>
+          <a:prstGeom prst="rect">
+            <a:avLst/>
+          </a:prstGeom>
+          <a:noFill/>
+        </p:spPr>
+        <p:txBody>
+          <a:bodyPr wrap="none" rtlCol="0">
+            <a:spAutoFit/>
+          </a:bodyPr>
+          <a:lstStyle/>
+          <a:p>
+            <a:r>
+              <a:rPr lang="en-US" dirty="0">
+                <a:latin typeface="Chalkboard" panose="03050602040202020205" pitchFamily="66" charset="77"/>
+              </a:rPr>
+              <a:t>Pfister &amp; </a:t>
+            </a:r>
+            <a:r>
+              <a:rPr lang="en-US" dirty="0" err="1">
+                <a:latin typeface="Chalkboard" panose="03050602040202020205" pitchFamily="66" charset="77"/>
+              </a:rPr>
+              <a:t>Blistein</a:t>
+            </a:r>
+            <a:endParaRPr lang="en-US" dirty="0">
+              <a:latin typeface="Chalkboard" panose="03050602040202020205" pitchFamily="66" charset="77"/>
+            </a:endParaRPr>
+          </a:p>
+        </p:txBody>
+      </p:sp>
+      <p:sp>
+        <p:nvSpPr>
+          <p:cNvPr id="25" name="Oval 24">
+            <a:extLst>
+              <a:ext uri="{FF2B5EF4-FFF2-40B4-BE49-F238E27FC236}">
+                <a16:creationId xmlns:a16="http://schemas.microsoft.com/office/drawing/2014/main" id="{89E9FAB6-D33B-058A-98D4-0AB6F514E822}"/>
+              </a:ext>
+            </a:extLst>
+          </p:cNvPr>
+          <p:cNvSpPr>
+            <a:spLocks noChangeAspect="1"/>
+          </p:cNvSpPr>
+          <p:nvPr/>
+        </p:nvSpPr>
+        <p:spPr>
+          <a:xfrm>
+            <a:off x="601434" y="4044351"/>
+            <a:ext cx="206893" cy="205856"/>
+          </a:xfrm>
+          <a:prstGeom prst="ellipse">
+            <a:avLst/>
+          </a:prstGeom>
+          <a:solidFill>
+            <a:schemeClr val="accent6"/>
+          </a:solidFill>
+          <a:ln>
+            <a:noFill/>
+          </a:ln>
+        </p:spPr>
+        <p:style>
+          <a:lnRef idx="2">
+            <a:schemeClr val="accent1">
+              <a:shade val="50000"/>
+            </a:schemeClr>
+          </a:lnRef>
+          <a:fillRef idx="1">
+            <a:schemeClr val="accent1"/>
+          </a:fillRef>
+          <a:effectRef idx="0">
+            <a:schemeClr val="accent1"/>
+          </a:effectRef>
+          <a:fontRef idx="minor">
+            <a:schemeClr val="lt1"/>
+          </a:fontRef>
+        </p:style>
+        <p:txBody>
+          <a:bodyPr rtlCol="0" anchor="ctr"/>
+          <a:lstStyle>
+            <a:defPPr>
+              <a:defRPr lang="en-US"/>
+            </a:defPPr>
+            <a:lvl1pPr marL="0" algn="l" defTabSz="914400" rtl="0" eaLnBrk="1" latinLnBrk="0" hangingPunct="1">
+              <a:defRPr sz="1800" kern="1200">
+                <a:solidFill>
+                  <a:schemeClr val="lt1"/>
+                </a:solidFill>
+                <a:latin typeface="+mn-lt"/>
+                <a:ea typeface="+mn-ea"/>
+                <a:cs typeface="+mn-cs"/>
+              </a:defRPr>
+            </a:lvl1pPr>
+            <a:lvl2pPr marL="457200" algn="l" defTabSz="914400" rtl="0" eaLnBrk="1" latinLnBrk="0" hangingPunct="1">
+              <a:defRPr sz="1800" kern="1200">
+                <a:solidFill>
+                  <a:schemeClr val="lt1"/>
+                </a:solidFill>
+                <a:latin typeface="+mn-lt"/>
+                <a:ea typeface="+mn-ea"/>
+                <a:cs typeface="+mn-cs"/>
+              </a:defRPr>
+            </a:lvl2pPr>
+            <a:lvl3pPr marL="914400" algn="l" defTabSz="914400" rtl="0" eaLnBrk="1" latinLnBrk="0" hangingPunct="1">
+              <a:defRPr sz="1800" kern="1200">
+                <a:solidFill>
+                  <a:schemeClr val="lt1"/>
+                </a:solidFill>
+                <a:latin typeface="+mn-lt"/>
+                <a:ea typeface="+mn-ea"/>
+                <a:cs typeface="+mn-cs"/>
+              </a:defRPr>
+            </a:lvl3pPr>
+            <a:lvl4pPr marL="1371600" algn="l" defTabSz="914400" rtl="0" eaLnBrk="1" latinLnBrk="0" hangingPunct="1">
+              <a:defRPr sz="1800" kern="1200">
+                <a:solidFill>
+                  <a:schemeClr val="lt1"/>
+                </a:solidFill>
+                <a:latin typeface="+mn-lt"/>
+                <a:ea typeface="+mn-ea"/>
+                <a:cs typeface="+mn-cs"/>
+              </a:defRPr>
+            </a:lvl4pPr>
+            <a:lvl5pPr marL="1828800" algn="l" defTabSz="914400" rtl="0" eaLnBrk="1" latinLnBrk="0" hangingPunct="1">
+              <a:defRPr sz="1800" kern="1200">
+                <a:solidFill>
+                  <a:schemeClr val="lt1"/>
+                </a:solidFill>
+                <a:latin typeface="+mn-lt"/>
+                <a:ea typeface="+mn-ea"/>
+                <a:cs typeface="+mn-cs"/>
+              </a:defRPr>
+            </a:lvl5pPr>
+            <a:lvl6pPr marL="2286000" algn="l" defTabSz="914400" rtl="0" eaLnBrk="1" latinLnBrk="0" hangingPunct="1">
+              <a:defRPr sz="1800" kern="1200">
+                <a:solidFill>
+                  <a:schemeClr val="lt1"/>
+                </a:solidFill>
+                <a:latin typeface="+mn-lt"/>
+                <a:ea typeface="+mn-ea"/>
+                <a:cs typeface="+mn-cs"/>
+              </a:defRPr>
+            </a:lvl6pPr>
+            <a:lvl7pPr marL="2743200" algn="l" defTabSz="914400" rtl="0" eaLnBrk="1" latinLnBrk="0" hangingPunct="1">
+              <a:defRPr sz="1800" kern="1200">
+                <a:solidFill>
+                  <a:schemeClr val="lt1"/>
+                </a:solidFill>
+                <a:latin typeface="+mn-lt"/>
+                <a:ea typeface="+mn-ea"/>
+                <a:cs typeface="+mn-cs"/>
+              </a:defRPr>
+            </a:lvl7pPr>
+            <a:lvl8pPr marL="3200400" algn="l" defTabSz="914400" rtl="0" eaLnBrk="1" latinLnBrk="0" hangingPunct="1">
+              <a:defRPr sz="1800" kern="1200">
+                <a:solidFill>
+                  <a:schemeClr val="lt1"/>
+                </a:solidFill>
+                <a:latin typeface="+mn-lt"/>
+                <a:ea typeface="+mn-ea"/>
+                <a:cs typeface="+mn-cs"/>
+              </a:defRPr>
+            </a:lvl8pPr>
+            <a:lvl9pPr marL="3657600" algn="l" defTabSz="914400" rtl="0" eaLnBrk="1" latinLnBrk="0" hangingPunct="1">
+              <a:defRPr sz="1800" kern="1200">
+                <a:solidFill>
+                  <a:schemeClr val="lt1"/>
+                </a:solidFill>
+                <a:latin typeface="+mn-lt"/>
+                <a:ea typeface="+mn-ea"/>
+                <a:cs typeface="+mn-cs"/>
+              </a:defRPr>
+            </a:lvl9pPr>
+          </a:lstStyle>
+          <a:p>
+            <a:pPr algn="ctr"/>
+            <a:endParaRPr lang="en-US" dirty="0"/>
+          </a:p>
+        </p:txBody>
+      </p:sp>
+      <p:sp>
+        <p:nvSpPr>
+          <p:cNvPr id="26" name="TextBox 25">
+            <a:extLst>
+              <a:ext uri="{FF2B5EF4-FFF2-40B4-BE49-F238E27FC236}">
+                <a16:creationId xmlns:a16="http://schemas.microsoft.com/office/drawing/2014/main" id="{5F4B935C-65E8-F369-E05C-A051AA317175}"/>
+              </a:ext>
+            </a:extLst>
+          </p:cNvPr>
+          <p:cNvSpPr txBox="1"/>
+          <p:nvPr/>
+        </p:nvSpPr>
+        <p:spPr>
+          <a:xfrm>
+            <a:off x="996075" y="3539537"/>
+            <a:ext cx="3484352" cy="369332"/>
+          </a:xfrm>
+          <a:prstGeom prst="rect">
+            <a:avLst/>
+          </a:prstGeom>
+          <a:noFill/>
+        </p:spPr>
+        <p:txBody>
+          <a:bodyPr wrap="none" rtlCol="0">
+            <a:spAutoFit/>
+          </a:bodyPr>
+          <a:lstStyle/>
+          <a:p>
+            <a:r>
+              <a:rPr lang="en-US" dirty="0">
+                <a:latin typeface="Chalkboard" panose="03050602040202020205" pitchFamily="66" charset="77"/>
+              </a:rPr>
+              <a:t>Protopapas, Rader, Levine, Dave</a:t>
+            </a:r>
+          </a:p>
+        </p:txBody>
+      </p:sp>
+      <p:sp>
+        <p:nvSpPr>
+          <p:cNvPr id="27" name="Oval 26">
+            <a:extLst>
+              <a:ext uri="{FF2B5EF4-FFF2-40B4-BE49-F238E27FC236}">
+                <a16:creationId xmlns:a16="http://schemas.microsoft.com/office/drawing/2014/main" id="{89E9FAB6-D33B-058A-98D4-0AB6F514E822}"/>
+              </a:ext>
+            </a:extLst>
+          </p:cNvPr>
+          <p:cNvSpPr>
+            <a:spLocks noChangeAspect="1"/>
+          </p:cNvSpPr>
+          <p:nvPr/>
+        </p:nvSpPr>
+        <p:spPr>
+          <a:xfrm>
+            <a:off x="601434" y="3597251"/>
+            <a:ext cx="206893" cy="205856"/>
+          </a:xfrm>
+          <a:prstGeom prst="ellipse">
+            <a:avLst/>
+          </a:prstGeom>
+          <a:solidFill>
+            <a:schemeClr val="accent6">
+              <a:lumMod val="75000"/>
+            </a:schemeClr>
+          </a:solidFill>
+          <a:ln>
+            <a:noFill/>
+          </a:ln>
+        </p:spPr>
+        <p:style>
+          <a:lnRef idx="2">
+            <a:schemeClr val="accent1">
+              <a:shade val="50000"/>
+            </a:schemeClr>
+          </a:lnRef>
+          <a:fillRef idx="1">
+            <a:schemeClr val="accent1"/>
+          </a:fillRef>
+          <a:effectRef idx="0">
+            <a:schemeClr val="accent1"/>
+          </a:effectRef>
+          <a:fontRef idx="minor">
+            <a:schemeClr val="lt1"/>
+          </a:fontRef>
+        </p:style>
+        <p:txBody>
+          <a:bodyPr rtlCol="0" anchor="ctr"/>
+          <a:lstStyle>
+            <a:defPPr>
+              <a:defRPr lang="en-US"/>
+            </a:defPPr>
+            <a:lvl1pPr marL="0" algn="l" defTabSz="914400" rtl="0" eaLnBrk="1" latinLnBrk="0" hangingPunct="1">
+              <a:defRPr sz="1800" kern="1200">
+                <a:solidFill>
+                  <a:schemeClr val="lt1"/>
+                </a:solidFill>
+                <a:latin typeface="+mn-lt"/>
+                <a:ea typeface="+mn-ea"/>
+                <a:cs typeface="+mn-cs"/>
+              </a:defRPr>
+            </a:lvl1pPr>
+            <a:lvl2pPr marL="457200" algn="l" defTabSz="914400" rtl="0" eaLnBrk="1" latinLnBrk="0" hangingPunct="1">
+              <a:defRPr sz="1800" kern="1200">
+                <a:solidFill>
+                  <a:schemeClr val="lt1"/>
+                </a:solidFill>
+                <a:latin typeface="+mn-lt"/>
+                <a:ea typeface="+mn-ea"/>
+                <a:cs typeface="+mn-cs"/>
+              </a:defRPr>
+            </a:lvl2pPr>
+            <a:lvl3pPr marL="914400" algn="l" defTabSz="914400" rtl="0" eaLnBrk="1" latinLnBrk="0" hangingPunct="1">
+              <a:defRPr sz="1800" kern="1200">
+                <a:solidFill>
+                  <a:schemeClr val="lt1"/>
+                </a:solidFill>
+                <a:latin typeface="+mn-lt"/>
+                <a:ea typeface="+mn-ea"/>
+                <a:cs typeface="+mn-cs"/>
+              </a:defRPr>
+            </a:lvl3pPr>
+            <a:lvl4pPr marL="1371600" algn="l" defTabSz="914400" rtl="0" eaLnBrk="1" latinLnBrk="0" hangingPunct="1">
+              <a:defRPr sz="1800" kern="1200">
+                <a:solidFill>
+                  <a:schemeClr val="lt1"/>
+                </a:solidFill>
+                <a:latin typeface="+mn-lt"/>
+                <a:ea typeface="+mn-ea"/>
+                <a:cs typeface="+mn-cs"/>
+              </a:defRPr>
+            </a:lvl4pPr>
+            <a:lvl5pPr marL="1828800" algn="l" defTabSz="914400" rtl="0" eaLnBrk="1" latinLnBrk="0" hangingPunct="1">
+              <a:defRPr sz="1800" kern="1200">
+                <a:solidFill>
+                  <a:schemeClr val="lt1"/>
+                </a:solidFill>
+                <a:latin typeface="+mn-lt"/>
+                <a:ea typeface="+mn-ea"/>
+                <a:cs typeface="+mn-cs"/>
+              </a:defRPr>
+            </a:lvl5pPr>
+            <a:lvl6pPr marL="2286000" algn="l" defTabSz="914400" rtl="0" eaLnBrk="1" latinLnBrk="0" hangingPunct="1">
+              <a:defRPr sz="1800" kern="1200">
+                <a:solidFill>
+                  <a:schemeClr val="lt1"/>
+                </a:solidFill>
+                <a:latin typeface="+mn-lt"/>
+                <a:ea typeface="+mn-ea"/>
+                <a:cs typeface="+mn-cs"/>
+              </a:defRPr>
+            </a:lvl6pPr>
+            <a:lvl7pPr marL="2743200" algn="l" defTabSz="914400" rtl="0" eaLnBrk="1" latinLnBrk="0" hangingPunct="1">
+              <a:defRPr sz="1800" kern="1200">
+                <a:solidFill>
+                  <a:schemeClr val="lt1"/>
+                </a:solidFill>
+                <a:latin typeface="+mn-lt"/>
+                <a:ea typeface="+mn-ea"/>
+                <a:cs typeface="+mn-cs"/>
+              </a:defRPr>
+            </a:lvl7pPr>
+            <a:lvl8pPr marL="3200400" algn="l" defTabSz="914400" rtl="0" eaLnBrk="1" latinLnBrk="0" hangingPunct="1">
+              <a:defRPr sz="1800" kern="1200">
+                <a:solidFill>
+                  <a:schemeClr val="lt1"/>
+                </a:solidFill>
+                <a:latin typeface="+mn-lt"/>
+                <a:ea typeface="+mn-ea"/>
+                <a:cs typeface="+mn-cs"/>
+              </a:defRPr>
+            </a:lvl8pPr>
+            <a:lvl9pPr marL="3657600" algn="l" defTabSz="914400" rtl="0" eaLnBrk="1" latinLnBrk="0" hangingPunct="1">
+              <a:defRPr sz="1800" kern="1200">
+                <a:solidFill>
+                  <a:schemeClr val="lt1"/>
+                </a:solidFill>
+                <a:latin typeface="+mn-lt"/>
+                <a:ea typeface="+mn-ea"/>
+                <a:cs typeface="+mn-cs"/>
+              </a:defRPr>
+            </a:lvl9pPr>
+          </a:lstStyle>
+          <a:p>
+            <a:pPr algn="ctr"/>
+            <a:endParaRPr lang="en-US" dirty="0"/>
+          </a:p>
+        </p:txBody>
+      </p:sp>
+      <p:sp>
+        <p:nvSpPr>
+          <p:cNvPr id="29" name="TextBox 28">
+            <a:extLst>
+              <a:ext uri="{FF2B5EF4-FFF2-40B4-BE49-F238E27FC236}">
+                <a16:creationId xmlns:a16="http://schemas.microsoft.com/office/drawing/2014/main" id="{7C8DD3AA-DF80-098B-75A9-ED06613E474C}"/>
+              </a:ext>
+            </a:extLst>
+          </p:cNvPr>
+          <p:cNvSpPr txBox="1"/>
+          <p:nvPr/>
+        </p:nvSpPr>
+        <p:spPr>
+          <a:xfrm>
+            <a:off x="984694" y="3998552"/>
+            <a:ext cx="2162772" cy="369332"/>
+          </a:xfrm>
+          <a:prstGeom prst="rect">
+            <a:avLst/>
+          </a:prstGeom>
+          <a:noFill/>
+        </p:spPr>
+        <p:txBody>
+          <a:bodyPr wrap="none" rtlCol="0">
+            <a:spAutoFit/>
+          </a:bodyPr>
+          <a:lstStyle/>
+          <a:p>
+            <a:r>
+              <a:rPr lang="en-US" dirty="0">
+                <a:latin typeface="Chalkboard" panose="03050602040202020205" pitchFamily="66" charset="77"/>
+              </a:rPr>
+              <a:t>Protopapas, Rader </a:t>
+            </a:r>
+          </a:p>
+        </p:txBody>
+      </p:sp>
+      <p:sp>
+        <p:nvSpPr>
+          <p:cNvPr id="47" name="TextBox 46">
+            <a:extLst>
+              <a:ext uri="{FF2B5EF4-FFF2-40B4-BE49-F238E27FC236}">
+                <a16:creationId xmlns:a16="http://schemas.microsoft.com/office/drawing/2014/main" id="{44226E8A-7525-D4DC-C795-90E5533BC764}"/>
+              </a:ext>
+            </a:extLst>
+          </p:cNvPr>
+          <p:cNvSpPr txBox="1"/>
+          <p:nvPr/>
+        </p:nvSpPr>
+        <p:spPr>
+          <a:xfrm>
+            <a:off x="6490957" y="2004194"/>
+            <a:ext cx="828688" cy="369332"/>
+          </a:xfrm>
+          <a:prstGeom prst="rect">
+            <a:avLst/>
+          </a:prstGeom>
+          <a:noFill/>
+        </p:spPr>
+        <p:txBody>
+          <a:bodyPr wrap="none" rtlCol="0">
+            <a:spAutoFit/>
+          </a:bodyPr>
+          <a:lstStyle/>
+          <a:p>
+            <a:r>
+              <a:rPr lang="en-US" dirty="0"/>
+              <a:t>Tanner</a:t>
+            </a:r>
+          </a:p>
+        </p:txBody>
+      </p:sp>
+      <p:sp>
+        <p:nvSpPr>
+          <p:cNvPr id="52" name="Oval 51">
+            <a:extLst>
+              <a:ext uri="{FF2B5EF4-FFF2-40B4-BE49-F238E27FC236}">
+                <a16:creationId xmlns:a16="http://schemas.microsoft.com/office/drawing/2014/main" id="{89E9FAB6-D33B-058A-98D4-0AB6F514E822}"/>
+              </a:ext>
+            </a:extLst>
+          </p:cNvPr>
+          <p:cNvSpPr>
+            <a:spLocks noChangeAspect="1"/>
+          </p:cNvSpPr>
+          <p:nvPr/>
+        </p:nvSpPr>
+        <p:spPr>
+          <a:xfrm>
+            <a:off x="4450395" y="4102638"/>
+            <a:ext cx="206893" cy="205856"/>
+          </a:xfrm>
+          <a:prstGeom prst="ellipse">
+            <a:avLst/>
+          </a:prstGeom>
+          <a:solidFill>
+            <a:schemeClr val="accent6">
+              <a:lumMod val="40000"/>
+              <a:lumOff val="60000"/>
+            </a:schemeClr>
+          </a:solidFill>
+          <a:ln>
+            <a:noFill/>
+          </a:ln>
+        </p:spPr>
+        <p:style>
+          <a:lnRef idx="2">
+            <a:schemeClr val="accent1">
+              <a:shade val="50000"/>
+            </a:schemeClr>
+          </a:lnRef>
+          <a:fillRef idx="1">
+            <a:schemeClr val="accent1"/>
+          </a:fillRef>
+          <a:effectRef idx="0">
+            <a:schemeClr val="accent1"/>
+          </a:effectRef>
+          <a:fontRef idx="minor">
+            <a:schemeClr val="lt1"/>
+          </a:fontRef>
+        </p:style>
+        <p:txBody>
+          <a:bodyPr rtlCol="0" anchor="ctr"/>
+          <a:lstStyle>
+            <a:defPPr>
+              <a:defRPr lang="en-US"/>
+            </a:defPPr>
+            <a:lvl1pPr marL="0" algn="l" defTabSz="914400" rtl="0" eaLnBrk="1" latinLnBrk="0" hangingPunct="1">
+              <a:defRPr sz="1800" kern="1200">
+                <a:solidFill>
+                  <a:schemeClr val="lt1"/>
+                </a:solidFill>
+                <a:latin typeface="+mn-lt"/>
+                <a:ea typeface="+mn-ea"/>
+                <a:cs typeface="+mn-cs"/>
+              </a:defRPr>
+            </a:lvl1pPr>
+            <a:lvl2pPr marL="457200" algn="l" defTabSz="914400" rtl="0" eaLnBrk="1" latinLnBrk="0" hangingPunct="1">
+              <a:defRPr sz="1800" kern="1200">
+                <a:solidFill>
+                  <a:schemeClr val="lt1"/>
+                </a:solidFill>
+                <a:latin typeface="+mn-lt"/>
+                <a:ea typeface="+mn-ea"/>
+                <a:cs typeface="+mn-cs"/>
+              </a:defRPr>
+            </a:lvl2pPr>
+            <a:lvl3pPr marL="914400" algn="l" defTabSz="914400" rtl="0" eaLnBrk="1" latinLnBrk="0" hangingPunct="1">
+              <a:defRPr sz="1800" kern="1200">
+                <a:solidFill>
+                  <a:schemeClr val="lt1"/>
+                </a:solidFill>
+                <a:latin typeface="+mn-lt"/>
+                <a:ea typeface="+mn-ea"/>
+                <a:cs typeface="+mn-cs"/>
+              </a:defRPr>
+            </a:lvl3pPr>
+            <a:lvl4pPr marL="1371600" algn="l" defTabSz="914400" rtl="0" eaLnBrk="1" latinLnBrk="0" hangingPunct="1">
+              <a:defRPr sz="1800" kern="1200">
+                <a:solidFill>
+                  <a:schemeClr val="lt1"/>
+                </a:solidFill>
+                <a:latin typeface="+mn-lt"/>
+                <a:ea typeface="+mn-ea"/>
+                <a:cs typeface="+mn-cs"/>
+              </a:defRPr>
+            </a:lvl4pPr>
+            <a:lvl5pPr marL="1828800" algn="l" defTabSz="914400" rtl="0" eaLnBrk="1" latinLnBrk="0" hangingPunct="1">
+              <a:defRPr sz="1800" kern="1200">
+                <a:solidFill>
+                  <a:schemeClr val="lt1"/>
+                </a:solidFill>
+                <a:latin typeface="+mn-lt"/>
+                <a:ea typeface="+mn-ea"/>
+                <a:cs typeface="+mn-cs"/>
+              </a:defRPr>
+            </a:lvl5pPr>
+            <a:lvl6pPr marL="2286000" algn="l" defTabSz="914400" rtl="0" eaLnBrk="1" latinLnBrk="0" hangingPunct="1">
+              <a:defRPr sz="1800" kern="1200">
+                <a:solidFill>
+                  <a:schemeClr val="lt1"/>
+                </a:solidFill>
+                <a:latin typeface="+mn-lt"/>
+                <a:ea typeface="+mn-ea"/>
+                <a:cs typeface="+mn-cs"/>
+              </a:defRPr>
+            </a:lvl6pPr>
+            <a:lvl7pPr marL="2743200" algn="l" defTabSz="914400" rtl="0" eaLnBrk="1" latinLnBrk="0" hangingPunct="1">
+              <a:defRPr sz="1800" kern="1200">
+                <a:solidFill>
+                  <a:schemeClr val="lt1"/>
+                </a:solidFill>
+                <a:latin typeface="+mn-lt"/>
+                <a:ea typeface="+mn-ea"/>
+                <a:cs typeface="+mn-cs"/>
+              </a:defRPr>
+            </a:lvl7pPr>
+            <a:lvl8pPr marL="3200400" algn="l" defTabSz="914400" rtl="0" eaLnBrk="1" latinLnBrk="0" hangingPunct="1">
+              <a:defRPr sz="1800" kern="1200">
+                <a:solidFill>
+                  <a:schemeClr val="lt1"/>
+                </a:solidFill>
+                <a:latin typeface="+mn-lt"/>
+                <a:ea typeface="+mn-ea"/>
+                <a:cs typeface="+mn-cs"/>
+              </a:defRPr>
+            </a:lvl8pPr>
+            <a:lvl9pPr marL="3657600" algn="l" defTabSz="914400" rtl="0" eaLnBrk="1" latinLnBrk="0" hangingPunct="1">
+              <a:defRPr sz="1800" kern="1200">
+                <a:solidFill>
+                  <a:schemeClr val="lt1"/>
+                </a:solidFill>
+                <a:latin typeface="+mn-lt"/>
+                <a:ea typeface="+mn-ea"/>
+                <a:cs typeface="+mn-cs"/>
+              </a:defRPr>
+            </a:lvl9pPr>
+          </a:lstStyle>
+          <a:p>
+            <a:pPr algn="ctr"/>
+            <a:endParaRPr lang="en-US" dirty="0"/>
+          </a:p>
+        </p:txBody>
+      </p:sp>
+      <p:sp>
+        <p:nvSpPr>
+          <p:cNvPr id="53" name="TextBox 52">
+            <a:extLst>
+              <a:ext uri="{FF2B5EF4-FFF2-40B4-BE49-F238E27FC236}">
+                <a16:creationId xmlns:a16="http://schemas.microsoft.com/office/drawing/2014/main" id="{F3E0CFFA-E526-E92F-489D-A66562C2774B}"/>
+              </a:ext>
+            </a:extLst>
+          </p:cNvPr>
+          <p:cNvSpPr txBox="1"/>
+          <p:nvPr/>
+        </p:nvSpPr>
+        <p:spPr>
+          <a:xfrm>
+            <a:off x="4921654" y="4044351"/>
+            <a:ext cx="2041072" cy="369332"/>
+          </a:xfrm>
+          <a:prstGeom prst="rect">
+            <a:avLst/>
+          </a:prstGeom>
+          <a:noFill/>
+        </p:spPr>
+        <p:txBody>
+          <a:bodyPr wrap="none" rtlCol="0">
+            <a:spAutoFit/>
+          </a:bodyPr>
+          <a:lstStyle/>
+          <a:p>
+            <a:r>
+              <a:rPr lang="en-US" dirty="0">
+                <a:latin typeface="Chalkboard" panose="03050602040202020205" pitchFamily="66" charset="77"/>
+              </a:rPr>
+              <a:t>Protopapas, Pillai </a:t>
+            </a:r>
+          </a:p>
+        </p:txBody>
+      </p:sp>
+      <p:sp>
+        <p:nvSpPr>
+          <p:cNvPr id="54" name="Oval 53">
+            <a:extLst>
+              <a:ext uri="{FF2B5EF4-FFF2-40B4-BE49-F238E27FC236}">
+                <a16:creationId xmlns:a16="http://schemas.microsoft.com/office/drawing/2014/main" id="{89E9FAB6-D33B-058A-98D4-0AB6F514E822}"/>
+              </a:ext>
+            </a:extLst>
+          </p:cNvPr>
+          <p:cNvSpPr>
+            <a:spLocks noChangeAspect="1"/>
+          </p:cNvSpPr>
+          <p:nvPr/>
+        </p:nvSpPr>
+        <p:spPr>
+          <a:xfrm>
+            <a:off x="4453148" y="4621044"/>
+            <a:ext cx="206893" cy="205856"/>
+          </a:xfrm>
+          <a:prstGeom prst="ellipse">
+            <a:avLst/>
+          </a:prstGeom>
+          <a:solidFill>
+            <a:schemeClr val="accent6">
+              <a:lumMod val="50000"/>
+            </a:schemeClr>
+          </a:solidFill>
+          <a:ln>
+            <a:noFill/>
+          </a:ln>
+        </p:spPr>
+        <p:style>
+          <a:lnRef idx="2">
+            <a:schemeClr val="accent1">
+              <a:shade val="50000"/>
+            </a:schemeClr>
+          </a:lnRef>
+          <a:fillRef idx="1">
+            <a:schemeClr val="accent1"/>
+          </a:fillRef>
+          <a:effectRef idx="0">
+            <a:schemeClr val="accent1"/>
+          </a:effectRef>
+          <a:fontRef idx="minor">
+            <a:schemeClr val="lt1"/>
+          </a:fontRef>
+        </p:style>
+        <p:txBody>
+          <a:bodyPr rtlCol="0" anchor="ctr"/>
+          <a:lstStyle>
+            <a:defPPr>
+              <a:defRPr lang="en-US"/>
+            </a:defPPr>
+            <a:lvl1pPr marL="0" algn="l" defTabSz="914400" rtl="0" eaLnBrk="1" latinLnBrk="0" hangingPunct="1">
+              <a:defRPr sz="1800" kern="1200">
+                <a:solidFill>
+                  <a:schemeClr val="lt1"/>
+                </a:solidFill>
+                <a:latin typeface="+mn-lt"/>
+                <a:ea typeface="+mn-ea"/>
+                <a:cs typeface="+mn-cs"/>
+              </a:defRPr>
+            </a:lvl1pPr>
+            <a:lvl2pPr marL="457200" algn="l" defTabSz="914400" rtl="0" eaLnBrk="1" latinLnBrk="0" hangingPunct="1">
+              <a:defRPr sz="1800" kern="1200">
+                <a:solidFill>
+                  <a:schemeClr val="lt1"/>
+                </a:solidFill>
+                <a:latin typeface="+mn-lt"/>
+                <a:ea typeface="+mn-ea"/>
+                <a:cs typeface="+mn-cs"/>
+              </a:defRPr>
+            </a:lvl2pPr>
+            <a:lvl3pPr marL="914400" algn="l" defTabSz="914400" rtl="0" eaLnBrk="1" latinLnBrk="0" hangingPunct="1">
+              <a:defRPr sz="1800" kern="1200">
+                <a:solidFill>
+                  <a:schemeClr val="lt1"/>
+                </a:solidFill>
+                <a:latin typeface="+mn-lt"/>
+                <a:ea typeface="+mn-ea"/>
+                <a:cs typeface="+mn-cs"/>
+              </a:defRPr>
+            </a:lvl3pPr>
+            <a:lvl4pPr marL="1371600" algn="l" defTabSz="914400" rtl="0" eaLnBrk="1" latinLnBrk="0" hangingPunct="1">
+              <a:defRPr sz="1800" kern="1200">
+                <a:solidFill>
+                  <a:schemeClr val="lt1"/>
+                </a:solidFill>
+                <a:latin typeface="+mn-lt"/>
+                <a:ea typeface="+mn-ea"/>
+                <a:cs typeface="+mn-cs"/>
+              </a:defRPr>
+            </a:lvl4pPr>
+            <a:lvl5pPr marL="1828800" algn="l" defTabSz="914400" rtl="0" eaLnBrk="1" latinLnBrk="0" hangingPunct="1">
+              <a:defRPr sz="1800" kern="1200">
+                <a:solidFill>
+                  <a:schemeClr val="lt1"/>
+                </a:solidFill>
+                <a:latin typeface="+mn-lt"/>
+                <a:ea typeface="+mn-ea"/>
+                <a:cs typeface="+mn-cs"/>
+              </a:defRPr>
+            </a:lvl5pPr>
+            <a:lvl6pPr marL="2286000" algn="l" defTabSz="914400" rtl="0" eaLnBrk="1" latinLnBrk="0" hangingPunct="1">
+              <a:defRPr sz="1800" kern="1200">
+                <a:solidFill>
+                  <a:schemeClr val="lt1"/>
+                </a:solidFill>
+                <a:latin typeface="+mn-lt"/>
+                <a:ea typeface="+mn-ea"/>
+                <a:cs typeface="+mn-cs"/>
+              </a:defRPr>
+            </a:lvl6pPr>
+            <a:lvl7pPr marL="2743200" algn="l" defTabSz="914400" rtl="0" eaLnBrk="1" latinLnBrk="0" hangingPunct="1">
+              <a:defRPr sz="1800" kern="1200">
+                <a:solidFill>
+                  <a:schemeClr val="lt1"/>
+                </a:solidFill>
+                <a:latin typeface="+mn-lt"/>
+                <a:ea typeface="+mn-ea"/>
+                <a:cs typeface="+mn-cs"/>
+              </a:defRPr>
+            </a:lvl7pPr>
+            <a:lvl8pPr marL="3200400" algn="l" defTabSz="914400" rtl="0" eaLnBrk="1" latinLnBrk="0" hangingPunct="1">
+              <a:defRPr sz="1800" kern="1200">
+                <a:solidFill>
+                  <a:schemeClr val="lt1"/>
+                </a:solidFill>
+                <a:latin typeface="+mn-lt"/>
+                <a:ea typeface="+mn-ea"/>
+                <a:cs typeface="+mn-cs"/>
+              </a:defRPr>
+            </a:lvl8pPr>
+            <a:lvl9pPr marL="3657600" algn="l" defTabSz="914400" rtl="0" eaLnBrk="1" latinLnBrk="0" hangingPunct="1">
+              <a:defRPr sz="1800" kern="1200">
+                <a:solidFill>
+                  <a:schemeClr val="lt1"/>
+                </a:solidFill>
+                <a:latin typeface="+mn-lt"/>
+                <a:ea typeface="+mn-ea"/>
+                <a:cs typeface="+mn-cs"/>
+              </a:defRPr>
+            </a:lvl9pPr>
+          </a:lstStyle>
+          <a:p>
+            <a:pPr algn="ctr"/>
+            <a:endParaRPr lang="en-US" dirty="0"/>
+          </a:p>
+        </p:txBody>
+      </p:sp>
+      <p:sp>
+        <p:nvSpPr>
+          <p:cNvPr id="55" name="TextBox 54">
+            <a:extLst>
+              <a:ext uri="{FF2B5EF4-FFF2-40B4-BE49-F238E27FC236}">
+                <a16:creationId xmlns:a16="http://schemas.microsoft.com/office/drawing/2014/main" id="{F9C6F9EE-C323-178B-D516-3A42293AC3F6}"/>
+              </a:ext>
+            </a:extLst>
+          </p:cNvPr>
+          <p:cNvSpPr txBox="1"/>
+          <p:nvPr/>
+        </p:nvSpPr>
+        <p:spPr>
+          <a:xfrm>
+            <a:off x="4945098" y="4524996"/>
+            <a:ext cx="2660215" cy="369332"/>
+          </a:xfrm>
+          <a:prstGeom prst="rect">
+            <a:avLst/>
+          </a:prstGeom>
+          <a:noFill/>
+        </p:spPr>
+        <p:txBody>
+          <a:bodyPr wrap="none" rtlCol="0">
+            <a:spAutoFit/>
+          </a:bodyPr>
+          <a:lstStyle/>
+          <a:p>
+            <a:r>
+              <a:rPr lang="en-US" dirty="0">
+                <a:latin typeface="Chalkboard" panose="03050602040202020205" pitchFamily="66" charset="77"/>
+              </a:rPr>
+              <a:t>Protopapas, Rader, Pen </a:t>
+            </a:r>
+          </a:p>
+        </p:txBody>
+      </p:sp>
+      <p:sp>
+        <p:nvSpPr>
+          <p:cNvPr id="57" name="Oval 56">
+            <a:extLst>
+              <a:ext uri="{FF2B5EF4-FFF2-40B4-BE49-F238E27FC236}">
+                <a16:creationId xmlns:a16="http://schemas.microsoft.com/office/drawing/2014/main" id="{89E9FAB6-D33B-058A-98D4-0AB6F514E822}"/>
+              </a:ext>
+            </a:extLst>
+          </p:cNvPr>
+          <p:cNvSpPr>
+            <a:spLocks noChangeAspect="1"/>
+          </p:cNvSpPr>
+          <p:nvPr/>
+        </p:nvSpPr>
+        <p:spPr>
+          <a:xfrm>
+            <a:off x="629239" y="5501281"/>
+            <a:ext cx="206893" cy="205856"/>
+          </a:xfrm>
+          <a:prstGeom prst="ellipse">
+            <a:avLst/>
+          </a:prstGeom>
+          <a:solidFill>
+            <a:schemeClr val="accent2">
+              <a:lumMod val="50000"/>
+              <a:alpha val="69013"/>
+            </a:schemeClr>
+          </a:solidFill>
+          <a:ln>
+            <a:noFill/>
+          </a:ln>
+        </p:spPr>
+        <p:style>
+          <a:lnRef idx="2">
+            <a:schemeClr val="accent1">
+              <a:shade val="50000"/>
+            </a:schemeClr>
+          </a:lnRef>
+          <a:fillRef idx="1">
+            <a:schemeClr val="accent1"/>
+          </a:fillRef>
+          <a:effectRef idx="0">
+            <a:schemeClr val="accent1"/>
+          </a:effectRef>
+          <a:fontRef idx="minor">
+            <a:schemeClr val="lt1"/>
+          </a:fontRef>
+        </p:style>
+        <p:txBody>
+          <a:bodyPr rtlCol="0" anchor="ctr"/>
+          <a:lstStyle>
+            <a:defPPr>
+              <a:defRPr lang="en-US"/>
+            </a:defPPr>
+            <a:lvl1pPr marL="0" algn="l" defTabSz="914400" rtl="0" eaLnBrk="1" latinLnBrk="0" hangingPunct="1">
+              <a:defRPr sz="1800" kern="1200">
+                <a:solidFill>
+                  <a:schemeClr val="lt1"/>
+                </a:solidFill>
+                <a:latin typeface="+mn-lt"/>
+                <a:ea typeface="+mn-ea"/>
+                <a:cs typeface="+mn-cs"/>
+              </a:defRPr>
+            </a:lvl1pPr>
+            <a:lvl2pPr marL="457200" algn="l" defTabSz="914400" rtl="0" eaLnBrk="1" latinLnBrk="0" hangingPunct="1">
+              <a:defRPr sz="1800" kern="1200">
+                <a:solidFill>
+                  <a:schemeClr val="lt1"/>
+                </a:solidFill>
+                <a:latin typeface="+mn-lt"/>
+                <a:ea typeface="+mn-ea"/>
+                <a:cs typeface="+mn-cs"/>
+              </a:defRPr>
+            </a:lvl2pPr>
+            <a:lvl3pPr marL="914400" algn="l" defTabSz="914400" rtl="0" eaLnBrk="1" latinLnBrk="0" hangingPunct="1">
+              <a:defRPr sz="1800" kern="1200">
+                <a:solidFill>
+                  <a:schemeClr val="lt1"/>
+                </a:solidFill>
+                <a:latin typeface="+mn-lt"/>
+                <a:ea typeface="+mn-ea"/>
+                <a:cs typeface="+mn-cs"/>
+              </a:defRPr>
+            </a:lvl3pPr>
+            <a:lvl4pPr marL="1371600" algn="l" defTabSz="914400" rtl="0" eaLnBrk="1" latinLnBrk="0" hangingPunct="1">
+              <a:defRPr sz="1800" kern="1200">
+                <a:solidFill>
+                  <a:schemeClr val="lt1"/>
+                </a:solidFill>
+                <a:latin typeface="+mn-lt"/>
+                <a:ea typeface="+mn-ea"/>
+                <a:cs typeface="+mn-cs"/>
+              </a:defRPr>
+            </a:lvl4pPr>
+            <a:lvl5pPr marL="1828800" algn="l" defTabSz="914400" rtl="0" eaLnBrk="1" latinLnBrk="0" hangingPunct="1">
+              <a:defRPr sz="1800" kern="1200">
+                <a:solidFill>
+                  <a:schemeClr val="lt1"/>
+                </a:solidFill>
+                <a:latin typeface="+mn-lt"/>
+                <a:ea typeface="+mn-ea"/>
+                <a:cs typeface="+mn-cs"/>
+              </a:defRPr>
+            </a:lvl5pPr>
+            <a:lvl6pPr marL="2286000" algn="l" defTabSz="914400" rtl="0" eaLnBrk="1" latinLnBrk="0" hangingPunct="1">
+              <a:defRPr sz="1800" kern="1200">
+                <a:solidFill>
+                  <a:schemeClr val="lt1"/>
+                </a:solidFill>
+                <a:latin typeface="+mn-lt"/>
+                <a:ea typeface="+mn-ea"/>
+                <a:cs typeface="+mn-cs"/>
+              </a:defRPr>
+            </a:lvl6pPr>
+            <a:lvl7pPr marL="2743200" algn="l" defTabSz="914400" rtl="0" eaLnBrk="1" latinLnBrk="0" hangingPunct="1">
+              <a:defRPr sz="1800" kern="1200">
+                <a:solidFill>
+                  <a:schemeClr val="lt1"/>
+                </a:solidFill>
+                <a:latin typeface="+mn-lt"/>
+                <a:ea typeface="+mn-ea"/>
+                <a:cs typeface="+mn-cs"/>
+              </a:defRPr>
+            </a:lvl7pPr>
+            <a:lvl8pPr marL="3200400" algn="l" defTabSz="914400" rtl="0" eaLnBrk="1" latinLnBrk="0" hangingPunct="1">
+              <a:defRPr sz="1800" kern="1200">
+                <a:solidFill>
+                  <a:schemeClr val="lt1"/>
+                </a:solidFill>
+                <a:latin typeface="+mn-lt"/>
+                <a:ea typeface="+mn-ea"/>
+                <a:cs typeface="+mn-cs"/>
+              </a:defRPr>
+            </a:lvl8pPr>
+            <a:lvl9pPr marL="3657600" algn="l" defTabSz="914400" rtl="0" eaLnBrk="1" latinLnBrk="0" hangingPunct="1">
+              <a:defRPr sz="1800" kern="1200">
+                <a:solidFill>
+                  <a:schemeClr val="lt1"/>
+                </a:solidFill>
+                <a:latin typeface="+mn-lt"/>
+                <a:ea typeface="+mn-ea"/>
+                <a:cs typeface="+mn-cs"/>
+              </a:defRPr>
+            </a:lvl9pPr>
+          </a:lstStyle>
+          <a:p>
+            <a:pPr algn="ctr"/>
+            <a:endParaRPr lang="en-US" dirty="0"/>
+          </a:p>
+        </p:txBody>
+      </p:sp>
+      <p:sp>
+        <p:nvSpPr>
+          <p:cNvPr id="59" name="TextBox 58">
+            <a:extLst>
+              <a:ext uri="{FF2B5EF4-FFF2-40B4-BE49-F238E27FC236}">
+                <a16:creationId xmlns:a16="http://schemas.microsoft.com/office/drawing/2014/main" id="{1383B0FF-F918-EC4E-87AC-E84E303A3D00}"/>
+              </a:ext>
+            </a:extLst>
+          </p:cNvPr>
+          <p:cNvSpPr txBox="1"/>
+          <p:nvPr/>
+        </p:nvSpPr>
+        <p:spPr>
+          <a:xfrm>
+            <a:off x="998514" y="5361797"/>
+            <a:ext cx="3168368" cy="369332"/>
+          </a:xfrm>
+          <a:prstGeom prst="rect">
+            <a:avLst/>
+          </a:prstGeom>
+          <a:noFill/>
+        </p:spPr>
+        <p:txBody>
+          <a:bodyPr wrap="none" rtlCol="0">
+            <a:spAutoFit/>
+          </a:bodyPr>
+          <a:lstStyle/>
+          <a:p>
+            <a:r>
+              <a:rPr lang="en-US" dirty="0">
+                <a:latin typeface="Chalkboard" panose="03050602040202020205" pitchFamily="66" charset="77"/>
+              </a:rPr>
+              <a:t>Pfister &amp; Glickman &amp; Verena</a:t>
+            </a:r>
+          </a:p>
+        </p:txBody>
+      </p:sp>
+      <p:sp>
+        <p:nvSpPr>
+          <p:cNvPr id="60" name="TextBox 59">
+            <a:extLst>
+              <a:ext uri="{FF2B5EF4-FFF2-40B4-BE49-F238E27FC236}">
+                <a16:creationId xmlns:a16="http://schemas.microsoft.com/office/drawing/2014/main" id="{05B6CEA8-8601-CF03-62AB-7AFF58A6FE29}"/>
+              </a:ext>
+            </a:extLst>
+          </p:cNvPr>
+          <p:cNvSpPr txBox="1"/>
+          <p:nvPr/>
+        </p:nvSpPr>
+        <p:spPr>
+          <a:xfrm>
+            <a:off x="4945098" y="5102937"/>
+            <a:ext cx="2966966" cy="369332"/>
+          </a:xfrm>
+          <a:prstGeom prst="rect">
+            <a:avLst/>
+          </a:prstGeom>
+          <a:noFill/>
+        </p:spPr>
+        <p:txBody>
+          <a:bodyPr wrap="none" rtlCol="0">
+            <a:spAutoFit/>
+          </a:bodyPr>
+          <a:lstStyle/>
+          <a:p>
+            <a:r>
+              <a:rPr lang="en-US" dirty="0">
+                <a:latin typeface="Chalkboard" panose="03050602040202020205" pitchFamily="66" charset="77"/>
+              </a:rPr>
+              <a:t>Protopapas, Glickman, Pen </a:t>
             </a:r>
           </a:p>
         </p:txBody>

</xml_diff>